<commit_message>
[Docs] Updated Proposal Presentation
</commit_message>
<xml_diff>
--- a/Presentations/Proposal/Proposal-TCPs.pptx
+++ b/Presentations/Proposal/Proposal-TCPs.pptx
@@ -4,13 +4,18 @@
   <p:sldMasterIdLst>
     <p:sldMasterId id="2147483648" r:id="rId1"/>
   </p:sldMasterIdLst>
+  <p:notesMasterIdLst>
+    <p:notesMasterId r:id="rId10"/>
+  </p:notesMasterIdLst>
   <p:sldIdLst>
     <p:sldId id="256" r:id="rId2"/>
     <p:sldId id="257" r:id="rId3"/>
-    <p:sldId id="258" r:id="rId4"/>
-    <p:sldId id="259" r:id="rId5"/>
-    <p:sldId id="260" r:id="rId6"/>
-    <p:sldId id="261" r:id="rId7"/>
+    <p:sldId id="262" r:id="rId4"/>
+    <p:sldId id="258" r:id="rId5"/>
+    <p:sldId id="263" r:id="rId6"/>
+    <p:sldId id="259" r:id="rId7"/>
+    <p:sldId id="260" r:id="rId8"/>
+    <p:sldId id="261" r:id="rId9"/>
   </p:sldIdLst>
   <p:sldSz cx="12192000" cy="6858000"/>
   <p:notesSz cx="6858000" cy="9144000"/>
@@ -117,6 +122,653 @@
 </p:presentation>
 </file>
 
+<file path=ppt/notesMasters/notesMaster1.xml><?xml version="1.0" encoding="utf-8"?>
+<p:notesMaster xmlns:a="http://schemas.openxmlformats.org/drawingml/2006/main" xmlns:r="http://schemas.openxmlformats.org/officeDocument/2006/relationships" xmlns:p="http://schemas.openxmlformats.org/presentationml/2006/main">
+  <p:cSld>
+    <p:bg>
+      <p:bgRef idx="1001">
+        <a:schemeClr val="bg1"/>
+      </p:bgRef>
+    </p:bg>
+    <p:spTree>
+      <p:nvGrpSpPr>
+        <p:cNvPr id="1" name=""/>
+        <p:cNvGrpSpPr/>
+        <p:nvPr/>
+      </p:nvGrpSpPr>
+      <p:grpSpPr>
+        <a:xfrm>
+          <a:off x="0" y="0"/>
+          <a:ext cx="0" cy="0"/>
+          <a:chOff x="0" y="0"/>
+          <a:chExt cx="0" cy="0"/>
+        </a:xfrm>
+      </p:grpSpPr>
+      <p:sp>
+        <p:nvSpPr>
+          <p:cNvPr id="2" name="머리글 개체 틀 1"/>
+          <p:cNvSpPr>
+            <a:spLocks noGrp="1"/>
+          </p:cNvSpPr>
+          <p:nvPr>
+            <p:ph type="hdr" sz="quarter"/>
+          </p:nvPr>
+        </p:nvSpPr>
+        <p:spPr>
+          <a:xfrm>
+            <a:off x="0" y="0"/>
+            <a:ext cx="2971800" cy="458788"/>
+          </a:xfrm>
+          <a:prstGeom prst="rect">
+            <a:avLst/>
+          </a:prstGeom>
+        </p:spPr>
+        <p:txBody>
+          <a:bodyPr vert="horz" lIns="91440" tIns="45720" rIns="91440" bIns="45720" rtlCol="0"/>
+          <a:lstStyle>
+            <a:lvl1pPr algn="l">
+              <a:defRPr sz="1200"/>
+            </a:lvl1pPr>
+          </a:lstStyle>
+          <a:p>
+            <a:endParaRPr lang="ko-KR" altLang="en-US"/>
+          </a:p>
+        </p:txBody>
+      </p:sp>
+      <p:sp>
+        <p:nvSpPr>
+          <p:cNvPr id="3" name="날짜 개체 틀 2"/>
+          <p:cNvSpPr>
+            <a:spLocks noGrp="1"/>
+          </p:cNvSpPr>
+          <p:nvPr>
+            <p:ph type="dt" idx="1"/>
+          </p:nvPr>
+        </p:nvSpPr>
+        <p:spPr>
+          <a:xfrm>
+            <a:off x="3884613" y="0"/>
+            <a:ext cx="2971800" cy="458788"/>
+          </a:xfrm>
+          <a:prstGeom prst="rect">
+            <a:avLst/>
+          </a:prstGeom>
+        </p:spPr>
+        <p:txBody>
+          <a:bodyPr vert="horz" lIns="91440" tIns="45720" rIns="91440" bIns="45720" rtlCol="0"/>
+          <a:lstStyle>
+            <a:lvl1pPr algn="r">
+              <a:defRPr sz="1200"/>
+            </a:lvl1pPr>
+          </a:lstStyle>
+          <a:p>
+            <a:fld id="{3F7D7CE1-F411-4B57-BDCF-B38EBBCBB5FE}" type="datetimeFigureOut">
+              <a:rPr lang="ko-KR" altLang="en-US" smtClean="0"/>
+              <a:t>2024-10-22</a:t>
+            </a:fld>
+            <a:endParaRPr lang="ko-KR" altLang="en-US"/>
+          </a:p>
+        </p:txBody>
+      </p:sp>
+      <p:sp>
+        <p:nvSpPr>
+          <p:cNvPr id="4" name="슬라이드 이미지 개체 틀 3"/>
+          <p:cNvSpPr>
+            <a:spLocks noGrp="1" noRot="1" noChangeAspect="1"/>
+          </p:cNvSpPr>
+          <p:nvPr>
+            <p:ph type="sldImg" idx="2"/>
+          </p:nvPr>
+        </p:nvSpPr>
+        <p:spPr>
+          <a:xfrm>
+            <a:off x="685800" y="1143000"/>
+            <a:ext cx="5486400" cy="3086100"/>
+          </a:xfrm>
+          <a:prstGeom prst="rect">
+            <a:avLst/>
+          </a:prstGeom>
+          <a:noFill/>
+          <a:ln w="12700">
+            <a:solidFill>
+              <a:prstClr val="black"/>
+            </a:solidFill>
+          </a:ln>
+        </p:spPr>
+        <p:txBody>
+          <a:bodyPr vert="horz" lIns="91440" tIns="45720" rIns="91440" bIns="45720" rtlCol="0" anchor="ctr"/>
+          <a:lstStyle/>
+          <a:p>
+            <a:endParaRPr lang="ko-KR" altLang="en-US"/>
+          </a:p>
+        </p:txBody>
+      </p:sp>
+      <p:sp>
+        <p:nvSpPr>
+          <p:cNvPr id="5" name="슬라이드 노트 개체 틀 4"/>
+          <p:cNvSpPr>
+            <a:spLocks noGrp="1"/>
+          </p:cNvSpPr>
+          <p:nvPr>
+            <p:ph type="body" sz="quarter" idx="3"/>
+          </p:nvPr>
+        </p:nvSpPr>
+        <p:spPr>
+          <a:xfrm>
+            <a:off x="685800" y="4400550"/>
+            <a:ext cx="5486400" cy="3600450"/>
+          </a:xfrm>
+          <a:prstGeom prst="rect">
+            <a:avLst/>
+          </a:prstGeom>
+        </p:spPr>
+        <p:txBody>
+          <a:bodyPr vert="horz" lIns="91440" tIns="45720" rIns="91440" bIns="45720" rtlCol="0"/>
+          <a:lstStyle/>
+          <a:p>
+            <a:pPr lvl="0"/>
+            <a:r>
+              <a:rPr lang="ko-KR" altLang="en-US"/>
+              <a:t>마스터 텍스트 스타일을 편집하려면 클릭</a:t>
+            </a:r>
+          </a:p>
+          <a:p>
+            <a:pPr lvl="1"/>
+            <a:r>
+              <a:rPr lang="ko-KR" altLang="en-US"/>
+              <a:t>두 번째 수준</a:t>
+            </a:r>
+          </a:p>
+          <a:p>
+            <a:pPr lvl="2"/>
+            <a:r>
+              <a:rPr lang="ko-KR" altLang="en-US"/>
+              <a:t>세 번째 수준</a:t>
+            </a:r>
+          </a:p>
+          <a:p>
+            <a:pPr lvl="3"/>
+            <a:r>
+              <a:rPr lang="ko-KR" altLang="en-US"/>
+              <a:t>네 번째 수준</a:t>
+            </a:r>
+          </a:p>
+          <a:p>
+            <a:pPr lvl="4"/>
+            <a:r>
+              <a:rPr lang="ko-KR" altLang="en-US"/>
+              <a:t>다섯 번째 수준</a:t>
+            </a:r>
+          </a:p>
+        </p:txBody>
+      </p:sp>
+      <p:sp>
+        <p:nvSpPr>
+          <p:cNvPr id="6" name="바닥글 개체 틀 5"/>
+          <p:cNvSpPr>
+            <a:spLocks noGrp="1"/>
+          </p:cNvSpPr>
+          <p:nvPr>
+            <p:ph type="ftr" sz="quarter" idx="4"/>
+          </p:nvPr>
+        </p:nvSpPr>
+        <p:spPr>
+          <a:xfrm>
+            <a:off x="0" y="8685213"/>
+            <a:ext cx="2971800" cy="458787"/>
+          </a:xfrm>
+          <a:prstGeom prst="rect">
+            <a:avLst/>
+          </a:prstGeom>
+        </p:spPr>
+        <p:txBody>
+          <a:bodyPr vert="horz" lIns="91440" tIns="45720" rIns="91440" bIns="45720" rtlCol="0" anchor="b"/>
+          <a:lstStyle>
+            <a:lvl1pPr algn="l">
+              <a:defRPr sz="1200"/>
+            </a:lvl1pPr>
+          </a:lstStyle>
+          <a:p>
+            <a:endParaRPr lang="ko-KR" altLang="en-US"/>
+          </a:p>
+        </p:txBody>
+      </p:sp>
+      <p:sp>
+        <p:nvSpPr>
+          <p:cNvPr id="7" name="슬라이드 번호 개체 틀 6"/>
+          <p:cNvSpPr>
+            <a:spLocks noGrp="1"/>
+          </p:cNvSpPr>
+          <p:nvPr>
+            <p:ph type="sldNum" sz="quarter" idx="5"/>
+          </p:nvPr>
+        </p:nvSpPr>
+        <p:spPr>
+          <a:xfrm>
+            <a:off x="3884613" y="8685213"/>
+            <a:ext cx="2971800" cy="458787"/>
+          </a:xfrm>
+          <a:prstGeom prst="rect">
+            <a:avLst/>
+          </a:prstGeom>
+        </p:spPr>
+        <p:txBody>
+          <a:bodyPr vert="horz" lIns="91440" tIns="45720" rIns="91440" bIns="45720" rtlCol="0" anchor="b"/>
+          <a:lstStyle>
+            <a:lvl1pPr algn="r">
+              <a:defRPr sz="1200"/>
+            </a:lvl1pPr>
+          </a:lstStyle>
+          <a:p>
+            <a:fld id="{DA11AF2F-D1C9-4876-A8B6-FE0D1C6B8F7E}" type="slidenum">
+              <a:rPr lang="ko-KR" altLang="en-US" smtClean="0"/>
+              <a:t>‹#›</a:t>
+            </a:fld>
+            <a:endParaRPr lang="ko-KR" altLang="en-US"/>
+          </a:p>
+        </p:txBody>
+      </p:sp>
+    </p:spTree>
+    <p:extLst>
+      <p:ext uri="{BB962C8B-B14F-4D97-AF65-F5344CB8AC3E}">
+        <p14:creationId xmlns:p14="http://schemas.microsoft.com/office/powerpoint/2010/main" val="2851510628"/>
+      </p:ext>
+    </p:extLst>
+  </p:cSld>
+  <p:clrMap bg1="lt1" tx1="dk1" bg2="lt2" tx2="dk2" accent1="accent1" accent2="accent2" accent3="accent3" accent4="accent4" accent5="accent5" accent6="accent6" hlink="hlink" folHlink="folHlink"/>
+  <p:notesStyle>
+    <a:lvl1pPr marL="0" algn="l" defTabSz="914400" rtl="0" eaLnBrk="1" latinLnBrk="1" hangingPunct="1">
+      <a:defRPr sz="1200" kern="1200">
+        <a:solidFill>
+          <a:schemeClr val="tx1"/>
+        </a:solidFill>
+        <a:latin typeface="+mn-lt"/>
+        <a:ea typeface="+mn-ea"/>
+        <a:cs typeface="+mn-cs"/>
+      </a:defRPr>
+    </a:lvl1pPr>
+    <a:lvl2pPr marL="457200" algn="l" defTabSz="914400" rtl="0" eaLnBrk="1" latinLnBrk="1" hangingPunct="1">
+      <a:defRPr sz="1200" kern="1200">
+        <a:solidFill>
+          <a:schemeClr val="tx1"/>
+        </a:solidFill>
+        <a:latin typeface="+mn-lt"/>
+        <a:ea typeface="+mn-ea"/>
+        <a:cs typeface="+mn-cs"/>
+      </a:defRPr>
+    </a:lvl2pPr>
+    <a:lvl3pPr marL="914400" algn="l" defTabSz="914400" rtl="0" eaLnBrk="1" latinLnBrk="1" hangingPunct="1">
+      <a:defRPr sz="1200" kern="1200">
+        <a:solidFill>
+          <a:schemeClr val="tx1"/>
+        </a:solidFill>
+        <a:latin typeface="+mn-lt"/>
+        <a:ea typeface="+mn-ea"/>
+        <a:cs typeface="+mn-cs"/>
+      </a:defRPr>
+    </a:lvl3pPr>
+    <a:lvl4pPr marL="1371600" algn="l" defTabSz="914400" rtl="0" eaLnBrk="1" latinLnBrk="1" hangingPunct="1">
+      <a:defRPr sz="1200" kern="1200">
+        <a:solidFill>
+          <a:schemeClr val="tx1"/>
+        </a:solidFill>
+        <a:latin typeface="+mn-lt"/>
+        <a:ea typeface="+mn-ea"/>
+        <a:cs typeface="+mn-cs"/>
+      </a:defRPr>
+    </a:lvl4pPr>
+    <a:lvl5pPr marL="1828800" algn="l" defTabSz="914400" rtl="0" eaLnBrk="1" latinLnBrk="1" hangingPunct="1">
+      <a:defRPr sz="1200" kern="1200">
+        <a:solidFill>
+          <a:schemeClr val="tx1"/>
+        </a:solidFill>
+        <a:latin typeface="+mn-lt"/>
+        <a:ea typeface="+mn-ea"/>
+        <a:cs typeface="+mn-cs"/>
+      </a:defRPr>
+    </a:lvl5pPr>
+    <a:lvl6pPr marL="2286000" algn="l" defTabSz="914400" rtl="0" eaLnBrk="1" latinLnBrk="1" hangingPunct="1">
+      <a:defRPr sz="1200" kern="1200">
+        <a:solidFill>
+          <a:schemeClr val="tx1"/>
+        </a:solidFill>
+        <a:latin typeface="+mn-lt"/>
+        <a:ea typeface="+mn-ea"/>
+        <a:cs typeface="+mn-cs"/>
+      </a:defRPr>
+    </a:lvl6pPr>
+    <a:lvl7pPr marL="2743200" algn="l" defTabSz="914400" rtl="0" eaLnBrk="1" latinLnBrk="1" hangingPunct="1">
+      <a:defRPr sz="1200" kern="1200">
+        <a:solidFill>
+          <a:schemeClr val="tx1"/>
+        </a:solidFill>
+        <a:latin typeface="+mn-lt"/>
+        <a:ea typeface="+mn-ea"/>
+        <a:cs typeface="+mn-cs"/>
+      </a:defRPr>
+    </a:lvl7pPr>
+    <a:lvl8pPr marL="3200400" algn="l" defTabSz="914400" rtl="0" eaLnBrk="1" latinLnBrk="1" hangingPunct="1">
+      <a:defRPr sz="1200" kern="1200">
+        <a:solidFill>
+          <a:schemeClr val="tx1"/>
+        </a:solidFill>
+        <a:latin typeface="+mn-lt"/>
+        <a:ea typeface="+mn-ea"/>
+        <a:cs typeface="+mn-cs"/>
+      </a:defRPr>
+    </a:lvl8pPr>
+    <a:lvl9pPr marL="3657600" algn="l" defTabSz="914400" rtl="0" eaLnBrk="1" latinLnBrk="1" hangingPunct="1">
+      <a:defRPr sz="1200" kern="1200">
+        <a:solidFill>
+          <a:schemeClr val="tx1"/>
+        </a:solidFill>
+        <a:latin typeface="+mn-lt"/>
+        <a:ea typeface="+mn-ea"/>
+        <a:cs typeface="+mn-cs"/>
+      </a:defRPr>
+    </a:lvl9pPr>
+  </p:notesStyle>
+</p:notesMaster>
+</file>
+
+<file path=ppt/notesSlides/notesSlide1.xml><?xml version="1.0" encoding="utf-8"?>
+<p:notes xmlns:a="http://schemas.openxmlformats.org/drawingml/2006/main" xmlns:r="http://schemas.openxmlformats.org/officeDocument/2006/relationships" xmlns:p="http://schemas.openxmlformats.org/presentationml/2006/main">
+  <p:cSld>
+    <p:spTree>
+      <p:nvGrpSpPr>
+        <p:cNvPr id="1" name=""/>
+        <p:cNvGrpSpPr/>
+        <p:nvPr/>
+      </p:nvGrpSpPr>
+      <p:grpSpPr>
+        <a:xfrm>
+          <a:off x="0" y="0"/>
+          <a:ext cx="0" cy="0"/>
+          <a:chOff x="0" y="0"/>
+          <a:chExt cx="0" cy="0"/>
+        </a:xfrm>
+      </p:grpSpPr>
+      <p:sp>
+        <p:nvSpPr>
+          <p:cNvPr id="2" name="슬라이드 이미지 개체 틀 1"/>
+          <p:cNvSpPr>
+            <a:spLocks noGrp="1" noRot="1" noChangeAspect="1"/>
+          </p:cNvSpPr>
+          <p:nvPr>
+            <p:ph type="sldImg"/>
+          </p:nvPr>
+        </p:nvSpPr>
+        <p:spPr/>
+      </p:sp>
+      <p:sp>
+        <p:nvSpPr>
+          <p:cNvPr id="3" name="슬라이드 노트 개체 틀 2"/>
+          <p:cNvSpPr>
+            <a:spLocks noGrp="1"/>
+          </p:cNvSpPr>
+          <p:nvPr>
+            <p:ph type="body" idx="1"/>
+          </p:nvPr>
+        </p:nvSpPr>
+        <p:spPr/>
+        <p:txBody>
+          <a:bodyPr/>
+          <a:lstStyle/>
+          <a:p>
+            <a:r>
+              <a:rPr lang="en-US" altLang="ko-KR" dirty="0"/>
+              <a:t>There are two big ways to exercise for us.</a:t>
+            </a:r>
+            <a:br>
+              <a:rPr lang="en-US" altLang="ko-KR" dirty="0"/>
+            </a:br>
+            <a:r>
+              <a:rPr lang="en-US" altLang="ko-KR" dirty="0"/>
+              <a:t>One is going to gym offline, and another one is just watching related videos and follow them at home.</a:t>
+            </a:r>
+            <a:endParaRPr lang="ko-KR" altLang="en-US" dirty="0"/>
+          </a:p>
+        </p:txBody>
+      </p:sp>
+      <p:sp>
+        <p:nvSpPr>
+          <p:cNvPr id="4" name="슬라이드 번호 개체 틀 3"/>
+          <p:cNvSpPr>
+            <a:spLocks noGrp="1"/>
+          </p:cNvSpPr>
+          <p:nvPr>
+            <p:ph type="sldNum" sz="quarter" idx="5"/>
+          </p:nvPr>
+        </p:nvSpPr>
+        <p:spPr/>
+        <p:txBody>
+          <a:bodyPr/>
+          <a:lstStyle/>
+          <a:p>
+            <a:fld id="{DA11AF2F-D1C9-4876-A8B6-FE0D1C6B8F7E}" type="slidenum">
+              <a:rPr lang="ko-KR" altLang="en-US" smtClean="0"/>
+              <a:t>3</a:t>
+            </a:fld>
+            <a:endParaRPr lang="ko-KR" altLang="en-US"/>
+          </a:p>
+        </p:txBody>
+      </p:sp>
+    </p:spTree>
+    <p:extLst>
+      <p:ext uri="{BB962C8B-B14F-4D97-AF65-F5344CB8AC3E}">
+        <p14:creationId xmlns:p14="http://schemas.microsoft.com/office/powerpoint/2010/main" val="2622107910"/>
+      </p:ext>
+    </p:extLst>
+  </p:cSld>
+  <p:clrMapOvr>
+    <a:masterClrMapping/>
+  </p:clrMapOvr>
+</p:notes>
+</file>
+
+<file path=ppt/notesSlides/notesSlide2.xml><?xml version="1.0" encoding="utf-8"?>
+<p:notes xmlns:a="http://schemas.openxmlformats.org/drawingml/2006/main" xmlns:r="http://schemas.openxmlformats.org/officeDocument/2006/relationships" xmlns:p="http://schemas.openxmlformats.org/presentationml/2006/main">
+  <p:cSld>
+    <p:spTree>
+      <p:nvGrpSpPr>
+        <p:cNvPr id="1" name=""/>
+        <p:cNvGrpSpPr/>
+        <p:nvPr/>
+      </p:nvGrpSpPr>
+      <p:grpSpPr>
+        <a:xfrm>
+          <a:off x="0" y="0"/>
+          <a:ext cx="0" cy="0"/>
+          <a:chOff x="0" y="0"/>
+          <a:chExt cx="0" cy="0"/>
+        </a:xfrm>
+      </p:grpSpPr>
+      <p:sp>
+        <p:nvSpPr>
+          <p:cNvPr id="2" name="슬라이드 이미지 개체 틀 1"/>
+          <p:cNvSpPr>
+            <a:spLocks noGrp="1" noRot="1" noChangeAspect="1"/>
+          </p:cNvSpPr>
+          <p:nvPr>
+            <p:ph type="sldImg"/>
+          </p:nvPr>
+        </p:nvSpPr>
+        <p:spPr/>
+      </p:sp>
+      <p:sp>
+        <p:nvSpPr>
+          <p:cNvPr id="3" name="슬라이드 노트 개체 틀 2"/>
+          <p:cNvSpPr>
+            <a:spLocks noGrp="1"/>
+          </p:cNvSpPr>
+          <p:nvPr>
+            <p:ph type="body" idx="1"/>
+          </p:nvPr>
+        </p:nvSpPr>
+        <p:spPr/>
+        <p:txBody>
+          <a:bodyPr/>
+          <a:lstStyle/>
+          <a:p>
+            <a:r>
+              <a:rPr lang="en-US" altLang="ko-KR" dirty="0"/>
+              <a:t>In case when we watch videos to exercise, there are two ways, listening sounds or watching the screen.</a:t>
+            </a:r>
+            <a:br>
+              <a:rPr lang="en-US" altLang="ko-KR" dirty="0"/>
+            </a:br>
+            <a:r>
+              <a:rPr lang="en-US" altLang="ko-KR" dirty="0"/>
+              <a:t>However, both methods have disadvantages. We can’t concentrate on the screen while exercising, and we can’t check whether we are doing right only listening sounds.</a:t>
+            </a:r>
+            <a:endParaRPr lang="ko-KR" altLang="en-US" dirty="0"/>
+          </a:p>
+        </p:txBody>
+      </p:sp>
+      <p:sp>
+        <p:nvSpPr>
+          <p:cNvPr id="4" name="슬라이드 번호 개체 틀 3"/>
+          <p:cNvSpPr>
+            <a:spLocks noGrp="1"/>
+          </p:cNvSpPr>
+          <p:nvPr>
+            <p:ph type="sldNum" sz="quarter" idx="5"/>
+          </p:nvPr>
+        </p:nvSpPr>
+        <p:spPr/>
+        <p:txBody>
+          <a:bodyPr/>
+          <a:lstStyle/>
+          <a:p>
+            <a:fld id="{DA11AF2F-D1C9-4876-A8B6-FE0D1C6B8F7E}" type="slidenum">
+              <a:rPr lang="ko-KR" altLang="en-US" smtClean="0"/>
+              <a:t>4</a:t>
+            </a:fld>
+            <a:endParaRPr lang="ko-KR" altLang="en-US"/>
+          </a:p>
+        </p:txBody>
+      </p:sp>
+    </p:spTree>
+    <p:extLst>
+      <p:ext uri="{BB962C8B-B14F-4D97-AF65-F5344CB8AC3E}">
+        <p14:creationId xmlns:p14="http://schemas.microsoft.com/office/powerpoint/2010/main" val="886013006"/>
+      </p:ext>
+    </p:extLst>
+  </p:cSld>
+  <p:clrMapOvr>
+    <a:masterClrMapping/>
+  </p:clrMapOvr>
+</p:notes>
+</file>
+
+<file path=ppt/notesSlides/notesSlide3.xml><?xml version="1.0" encoding="utf-8"?>
+<p:notes xmlns:a="http://schemas.openxmlformats.org/drawingml/2006/main" xmlns:r="http://schemas.openxmlformats.org/officeDocument/2006/relationships" xmlns:p="http://schemas.openxmlformats.org/presentationml/2006/main">
+  <p:cSld>
+    <p:spTree>
+      <p:nvGrpSpPr>
+        <p:cNvPr id="1" name="">
+          <a:extLst>
+            <a:ext uri="{FF2B5EF4-FFF2-40B4-BE49-F238E27FC236}">
+              <a16:creationId xmlns:a16="http://schemas.microsoft.com/office/drawing/2014/main" id="{05917720-5139-983F-A478-9B7E57BFD339}"/>
+            </a:ext>
+          </a:extLst>
+        </p:cNvPr>
+        <p:cNvGrpSpPr/>
+        <p:nvPr/>
+      </p:nvGrpSpPr>
+      <p:grpSpPr>
+        <a:xfrm>
+          <a:off x="0" y="0"/>
+          <a:ext cx="0" cy="0"/>
+          <a:chOff x="0" y="0"/>
+          <a:chExt cx="0" cy="0"/>
+        </a:xfrm>
+      </p:grpSpPr>
+      <p:sp>
+        <p:nvSpPr>
+          <p:cNvPr id="2" name="슬라이드 이미지 개체 틀 1">
+            <a:extLst>
+              <a:ext uri="{FF2B5EF4-FFF2-40B4-BE49-F238E27FC236}">
+                <a16:creationId xmlns:a16="http://schemas.microsoft.com/office/drawing/2014/main" id="{1F733187-E02C-A3CD-B511-F1C59908B78B}"/>
+              </a:ext>
+            </a:extLst>
+          </p:cNvPr>
+          <p:cNvSpPr>
+            <a:spLocks noGrp="1" noRot="1" noChangeAspect="1"/>
+          </p:cNvSpPr>
+          <p:nvPr>
+            <p:ph type="sldImg"/>
+          </p:nvPr>
+        </p:nvSpPr>
+        <p:spPr/>
+      </p:sp>
+      <p:sp>
+        <p:nvSpPr>
+          <p:cNvPr id="3" name="슬라이드 노트 개체 틀 2">
+            <a:extLst>
+              <a:ext uri="{FF2B5EF4-FFF2-40B4-BE49-F238E27FC236}">
+                <a16:creationId xmlns:a16="http://schemas.microsoft.com/office/drawing/2014/main" id="{10CD10CF-E806-A899-C6BE-F042108658E2}"/>
+              </a:ext>
+            </a:extLst>
+          </p:cNvPr>
+          <p:cNvSpPr>
+            <a:spLocks noGrp="1"/>
+          </p:cNvSpPr>
+          <p:nvPr>
+            <p:ph type="body" idx="1"/>
+          </p:nvPr>
+        </p:nvSpPr>
+        <p:spPr/>
+        <p:txBody>
+          <a:bodyPr/>
+          <a:lstStyle/>
+          <a:p>
+            <a:endParaRPr lang="ko-KR" altLang="en-US" dirty="0"/>
+          </a:p>
+        </p:txBody>
+      </p:sp>
+      <p:sp>
+        <p:nvSpPr>
+          <p:cNvPr id="4" name="슬라이드 번호 개체 틀 3">
+            <a:extLst>
+              <a:ext uri="{FF2B5EF4-FFF2-40B4-BE49-F238E27FC236}">
+                <a16:creationId xmlns:a16="http://schemas.microsoft.com/office/drawing/2014/main" id="{73B66CF5-7F2E-316E-C12D-20884A605D45}"/>
+              </a:ext>
+            </a:extLst>
+          </p:cNvPr>
+          <p:cNvSpPr>
+            <a:spLocks noGrp="1"/>
+          </p:cNvSpPr>
+          <p:nvPr>
+            <p:ph type="sldNum" sz="quarter" idx="5"/>
+          </p:nvPr>
+        </p:nvSpPr>
+        <p:spPr/>
+        <p:txBody>
+          <a:bodyPr/>
+          <a:lstStyle/>
+          <a:p>
+            <a:fld id="{DA11AF2F-D1C9-4876-A8B6-FE0D1C6B8F7E}" type="slidenum">
+              <a:rPr lang="ko-KR" altLang="en-US" smtClean="0"/>
+              <a:t>5</a:t>
+            </a:fld>
+            <a:endParaRPr lang="ko-KR" altLang="en-US"/>
+          </a:p>
+        </p:txBody>
+      </p:sp>
+    </p:spTree>
+    <p:extLst>
+      <p:ext uri="{BB962C8B-B14F-4D97-AF65-F5344CB8AC3E}">
+        <p14:creationId xmlns:p14="http://schemas.microsoft.com/office/powerpoint/2010/main" val="2625177859"/>
+      </p:ext>
+    </p:extLst>
+  </p:cSld>
+  <p:clrMapOvr>
+    <a:masterClrMapping/>
+  </p:clrMapOvr>
+</p:notes>
+</file>
+
 <file path=ppt/slideLayouts/slideLayout1.xml><?xml version="1.0" encoding="utf-8"?>
 <p:sldLayout xmlns:a="http://schemas.openxmlformats.org/drawingml/2006/main" xmlns:r="http://schemas.openxmlformats.org/officeDocument/2006/relationships" xmlns:p="http://schemas.openxmlformats.org/presentationml/2006/main" type="title" preserve="1">
   <p:cSld name="Title Slide">
@@ -266,7 +918,7 @@
           <a:p>
             <a:fld id="{09301BE2-276A-0643-9E06-75E6FE76E8D1}" type="datetimeFigureOut">
               <a:rPr lang="en-KR" smtClean="0"/>
-              <a:t>10/17/24</a:t>
+              <a:t>10/22/2024</a:t>
             </a:fld>
             <a:endParaRPr lang="en-KR"/>
           </a:p>
@@ -466,7 +1118,7 @@
           <a:p>
             <a:fld id="{09301BE2-276A-0643-9E06-75E6FE76E8D1}" type="datetimeFigureOut">
               <a:rPr lang="en-KR" smtClean="0"/>
-              <a:t>10/17/24</a:t>
+              <a:t>10/22/2024</a:t>
             </a:fld>
             <a:endParaRPr lang="en-KR"/>
           </a:p>
@@ -676,7 +1328,7 @@
           <a:p>
             <a:fld id="{09301BE2-276A-0643-9E06-75E6FE76E8D1}" type="datetimeFigureOut">
               <a:rPr lang="en-KR" smtClean="0"/>
-              <a:t>10/17/24</a:t>
+              <a:t>10/22/2024</a:t>
             </a:fld>
             <a:endParaRPr lang="en-KR"/>
           </a:p>
@@ -876,7 +1528,7 @@
           <a:p>
             <a:fld id="{09301BE2-276A-0643-9E06-75E6FE76E8D1}" type="datetimeFigureOut">
               <a:rPr lang="en-KR" smtClean="0"/>
-              <a:t>10/17/24</a:t>
+              <a:t>10/22/2024</a:t>
             </a:fld>
             <a:endParaRPr lang="en-KR"/>
           </a:p>
@@ -1152,7 +1804,7 @@
           <a:p>
             <a:fld id="{09301BE2-276A-0643-9E06-75E6FE76E8D1}" type="datetimeFigureOut">
               <a:rPr lang="en-KR" smtClean="0"/>
-              <a:t>10/17/24</a:t>
+              <a:t>10/22/2024</a:t>
             </a:fld>
             <a:endParaRPr lang="en-KR"/>
           </a:p>
@@ -1420,7 +2072,7 @@
           <a:p>
             <a:fld id="{09301BE2-276A-0643-9E06-75E6FE76E8D1}" type="datetimeFigureOut">
               <a:rPr lang="en-KR" smtClean="0"/>
-              <a:t>10/17/24</a:t>
+              <a:t>10/22/2024</a:t>
             </a:fld>
             <a:endParaRPr lang="en-KR"/>
           </a:p>
@@ -1835,7 +2487,7 @@
           <a:p>
             <a:fld id="{09301BE2-276A-0643-9E06-75E6FE76E8D1}" type="datetimeFigureOut">
               <a:rPr lang="en-KR" smtClean="0"/>
-              <a:t>10/17/24</a:t>
+              <a:t>10/22/2024</a:t>
             </a:fld>
             <a:endParaRPr lang="en-KR"/>
           </a:p>
@@ -1977,7 +2629,7 @@
           <a:p>
             <a:fld id="{09301BE2-276A-0643-9E06-75E6FE76E8D1}" type="datetimeFigureOut">
               <a:rPr lang="en-KR" smtClean="0"/>
-              <a:t>10/17/24</a:t>
+              <a:t>10/22/2024</a:t>
             </a:fld>
             <a:endParaRPr lang="en-KR"/>
           </a:p>
@@ -2090,7 +2742,7 @@
           <a:p>
             <a:fld id="{09301BE2-276A-0643-9E06-75E6FE76E8D1}" type="datetimeFigureOut">
               <a:rPr lang="en-KR" smtClean="0"/>
-              <a:t>10/17/24</a:t>
+              <a:t>10/22/2024</a:t>
             </a:fld>
             <a:endParaRPr lang="en-KR"/>
           </a:p>
@@ -2403,7 +3055,7 @@
           <a:p>
             <a:fld id="{09301BE2-276A-0643-9E06-75E6FE76E8D1}" type="datetimeFigureOut">
               <a:rPr lang="en-KR" smtClean="0"/>
-              <a:t>10/17/24</a:t>
+              <a:t>10/22/2024</a:t>
             </a:fld>
             <a:endParaRPr lang="en-KR"/>
           </a:p>
@@ -2692,7 +3344,7 @@
           <a:p>
             <a:fld id="{09301BE2-276A-0643-9E06-75E6FE76E8D1}" type="datetimeFigureOut">
               <a:rPr lang="en-KR" smtClean="0"/>
-              <a:t>10/17/24</a:t>
+              <a:t>10/22/2024</a:t>
             </a:fld>
             <a:endParaRPr lang="en-KR"/>
           </a:p>
@@ -2935,7 +3587,7 @@
           <a:p>
             <a:fld id="{09301BE2-276A-0643-9E06-75E6FE76E8D1}" type="datetimeFigureOut">
               <a:rPr lang="en-KR" smtClean="0"/>
-              <a:t>10/17/24</a:t>
+              <a:t>10/22/2024</a:t>
             </a:fld>
             <a:endParaRPr lang="en-KR"/>
           </a:p>
@@ -3352,79 +4004,322 @@
           <a:chExt cx="0" cy="0"/>
         </a:xfrm>
       </p:grpSpPr>
-      <p:sp>
-        <p:nvSpPr>
-          <p:cNvPr id="2" name="Title 1">
-            <a:extLst>
-              <a:ext uri="{FF2B5EF4-FFF2-40B4-BE49-F238E27FC236}">
-                <a16:creationId xmlns:a16="http://schemas.microsoft.com/office/drawing/2014/main" id="{B2C50112-CB7E-B78F-8572-C5BA44DA1BB0}"/>
-              </a:ext>
-            </a:extLst>
-          </p:cNvPr>
-          <p:cNvSpPr>
-            <a:spLocks noGrp="1"/>
-          </p:cNvSpPr>
-          <p:nvPr>
-            <p:ph type="ctrTitle"/>
-          </p:nvPr>
-        </p:nvSpPr>
-        <p:spPr>
+      <p:grpSp>
+        <p:nvGrpSpPr>
+          <p:cNvPr id="6" name="그룹 5">
+            <a:extLst>
+              <a:ext uri="{FF2B5EF4-FFF2-40B4-BE49-F238E27FC236}">
+                <a16:creationId xmlns:a16="http://schemas.microsoft.com/office/drawing/2014/main" id="{BBB088C5-D478-61EF-285D-99FAF1B64D74}"/>
+              </a:ext>
+            </a:extLst>
+          </p:cNvPr>
+          <p:cNvGrpSpPr/>
+          <p:nvPr/>
+        </p:nvGrpSpPr>
+        <p:grpSpPr>
           <a:xfrm>
-            <a:off x="0" y="4046483"/>
-            <a:ext cx="12192000" cy="1013756"/>
+            <a:off x="0" y="2173494"/>
+            <a:ext cx="12192000" cy="2511012"/>
+            <a:chOff x="0" y="2478238"/>
+            <a:chExt cx="12192000" cy="2511012"/>
           </a:xfrm>
-        </p:spPr>
-        <p:txBody>
-          <a:bodyPr/>
-          <a:lstStyle/>
-          <a:p>
-            <a:pPr algn="l"/>
-            <a:r>
-              <a:rPr lang="en-KR" b="1" dirty="0">
-                <a:latin typeface="Avenir Next LT Pro" panose="020B0504020202020204" pitchFamily="34" charset="77"/>
-                <a:cs typeface="Segoe UI" panose="020F0502020204030204" pitchFamily="34" charset="0"/>
-              </a:rPr>
-              <a:t>CSED404 Proposal Presentation</a:t>
-            </a:r>
-          </a:p>
-        </p:txBody>
-      </p:sp>
-      <p:sp>
-        <p:nvSpPr>
-          <p:cNvPr id="3" name="Subtitle 2">
-            <a:extLst>
-              <a:ext uri="{FF2B5EF4-FFF2-40B4-BE49-F238E27FC236}">
-                <a16:creationId xmlns:a16="http://schemas.microsoft.com/office/drawing/2014/main" id="{6440112C-511C-910F-C0C8-3BFA02977A44}"/>
-              </a:ext>
-            </a:extLst>
-          </p:cNvPr>
-          <p:cNvSpPr>
-            <a:spLocks noGrp="1"/>
-          </p:cNvSpPr>
-          <p:nvPr>
-            <p:ph type="subTitle" idx="1"/>
-          </p:nvPr>
-        </p:nvSpPr>
-        <p:spPr>
-          <a:xfrm>
-            <a:off x="0" y="5152314"/>
-            <a:ext cx="9144000" cy="1655762"/>
-          </a:xfrm>
-        </p:spPr>
-        <p:txBody>
-          <a:bodyPr/>
-          <a:lstStyle/>
-          <a:p>
-            <a:r>
-              <a:rPr lang="en-KR" dirty="0"/>
-              <a:t>TCPs</a:t>
-            </a:r>
-          </a:p>
-          <a:p>
-            <a:endParaRPr lang="en-KR" dirty="0"/>
-          </a:p>
-        </p:txBody>
-      </p:sp>
+        </p:grpSpPr>
+        <p:sp>
+          <p:nvSpPr>
+            <p:cNvPr id="4" name="Title 1">
+              <a:extLst>
+                <a:ext uri="{FF2B5EF4-FFF2-40B4-BE49-F238E27FC236}">
+                  <a16:creationId xmlns:a16="http://schemas.microsoft.com/office/drawing/2014/main" id="{CEF8AB69-FDF7-0B48-88E3-6C23CC5B5644}"/>
+                </a:ext>
+              </a:extLst>
+            </p:cNvPr>
+            <p:cNvSpPr txBox="1">
+              <a:spLocks/>
+            </p:cNvSpPr>
+            <p:nvPr/>
+          </p:nvSpPr>
+          <p:spPr>
+            <a:xfrm>
+              <a:off x="0" y="2478238"/>
+              <a:ext cx="12192000" cy="1013756"/>
+            </a:xfrm>
+            <a:prstGeom prst="rect">
+              <a:avLst/>
+            </a:prstGeom>
+          </p:spPr>
+          <p:txBody>
+            <a:bodyPr vert="horz" lIns="91440" tIns="45720" rIns="91440" bIns="45720" rtlCol="0" anchor="b">
+              <a:normAutofit/>
+            </a:bodyPr>
+            <a:lstStyle>
+              <a:lvl1pPr algn="ctr" defTabSz="914400" rtl="0" eaLnBrk="1" latinLnBrk="0" hangingPunct="1">
+                <a:lnSpc>
+                  <a:spcPct val="90000"/>
+                </a:lnSpc>
+                <a:spcBef>
+                  <a:spcPct val="0"/>
+                </a:spcBef>
+                <a:buNone/>
+                <a:defRPr sz="6000" kern="1200">
+                  <a:solidFill>
+                    <a:schemeClr val="tx1"/>
+                  </a:solidFill>
+                  <a:latin typeface="+mj-lt"/>
+                  <a:ea typeface="+mj-ea"/>
+                  <a:cs typeface="+mj-cs"/>
+                </a:defRPr>
+              </a:lvl1pPr>
+            </a:lstStyle>
+            <a:p>
+              <a:r>
+                <a:rPr lang="en-KR" b="1" dirty="0">
+                  <a:latin typeface="Avenir Next LT Pro" panose="020B0504020202020204" pitchFamily="34" charset="77"/>
+                  <a:cs typeface="Segoe UI" panose="020F0502020204030204" pitchFamily="34" charset="0"/>
+                </a:rPr>
+                <a:t>CSED404 Proposal Presentation</a:t>
+              </a:r>
+            </a:p>
+          </p:txBody>
+        </p:sp>
+        <p:sp>
+          <p:nvSpPr>
+            <p:cNvPr id="5" name="Subtitle 2">
+              <a:extLst>
+                <a:ext uri="{FF2B5EF4-FFF2-40B4-BE49-F238E27FC236}">
+                  <a16:creationId xmlns:a16="http://schemas.microsoft.com/office/drawing/2014/main" id="{37178ECC-19B9-B66E-A8FC-D20E6144B48D}"/>
+                </a:ext>
+              </a:extLst>
+            </p:cNvPr>
+            <p:cNvSpPr txBox="1">
+              <a:spLocks/>
+            </p:cNvSpPr>
+            <p:nvPr/>
+          </p:nvSpPr>
+          <p:spPr>
+            <a:xfrm>
+              <a:off x="1524000" y="4291180"/>
+              <a:ext cx="9144000" cy="698070"/>
+            </a:xfrm>
+            <a:prstGeom prst="rect">
+              <a:avLst/>
+            </a:prstGeom>
+          </p:spPr>
+          <p:txBody>
+            <a:bodyPr vert="horz" lIns="91440" tIns="45720" rIns="91440" bIns="45720" rtlCol="0">
+              <a:normAutofit/>
+            </a:bodyPr>
+            <a:lstStyle>
+              <a:lvl1pPr marL="0" indent="0" algn="ctr" defTabSz="914400" rtl="0" eaLnBrk="1" latinLnBrk="0" hangingPunct="1">
+                <a:lnSpc>
+                  <a:spcPct val="90000"/>
+                </a:lnSpc>
+                <a:spcBef>
+                  <a:spcPts val="1000"/>
+                </a:spcBef>
+                <a:buFont typeface="Arial" panose="020B0604020202020204" pitchFamily="34" charset="0"/>
+                <a:buNone/>
+                <a:defRPr sz="2400" kern="1200">
+                  <a:solidFill>
+                    <a:schemeClr val="tx1"/>
+                  </a:solidFill>
+                  <a:latin typeface="+mn-lt"/>
+                  <a:ea typeface="+mn-ea"/>
+                  <a:cs typeface="+mn-cs"/>
+                </a:defRPr>
+              </a:lvl1pPr>
+              <a:lvl2pPr marL="457200" indent="0" algn="ctr" defTabSz="914400" rtl="0" eaLnBrk="1" latinLnBrk="0" hangingPunct="1">
+                <a:lnSpc>
+                  <a:spcPct val="90000"/>
+                </a:lnSpc>
+                <a:spcBef>
+                  <a:spcPts val="500"/>
+                </a:spcBef>
+                <a:buFont typeface="Arial" panose="020B0604020202020204" pitchFamily="34" charset="0"/>
+                <a:buNone/>
+                <a:defRPr sz="2000" kern="1200">
+                  <a:solidFill>
+                    <a:schemeClr val="tx1"/>
+                  </a:solidFill>
+                  <a:latin typeface="+mn-lt"/>
+                  <a:ea typeface="+mn-ea"/>
+                  <a:cs typeface="+mn-cs"/>
+                </a:defRPr>
+              </a:lvl2pPr>
+              <a:lvl3pPr marL="914400" indent="0" algn="ctr" defTabSz="914400" rtl="0" eaLnBrk="1" latinLnBrk="0" hangingPunct="1">
+                <a:lnSpc>
+                  <a:spcPct val="90000"/>
+                </a:lnSpc>
+                <a:spcBef>
+                  <a:spcPts val="500"/>
+                </a:spcBef>
+                <a:buFont typeface="Arial" panose="020B0604020202020204" pitchFamily="34" charset="0"/>
+                <a:buNone/>
+                <a:defRPr sz="1800" kern="1200">
+                  <a:solidFill>
+                    <a:schemeClr val="tx1"/>
+                  </a:solidFill>
+                  <a:latin typeface="+mn-lt"/>
+                  <a:ea typeface="+mn-ea"/>
+                  <a:cs typeface="+mn-cs"/>
+                </a:defRPr>
+              </a:lvl3pPr>
+              <a:lvl4pPr marL="1371600" indent="0" algn="ctr" defTabSz="914400" rtl="0" eaLnBrk="1" latinLnBrk="0" hangingPunct="1">
+                <a:lnSpc>
+                  <a:spcPct val="90000"/>
+                </a:lnSpc>
+                <a:spcBef>
+                  <a:spcPts val="500"/>
+                </a:spcBef>
+                <a:buFont typeface="Arial" panose="020B0604020202020204" pitchFamily="34" charset="0"/>
+                <a:buNone/>
+                <a:defRPr sz="1600" kern="1200">
+                  <a:solidFill>
+                    <a:schemeClr val="tx1"/>
+                  </a:solidFill>
+                  <a:latin typeface="+mn-lt"/>
+                  <a:ea typeface="+mn-ea"/>
+                  <a:cs typeface="+mn-cs"/>
+                </a:defRPr>
+              </a:lvl4pPr>
+              <a:lvl5pPr marL="1828800" indent="0" algn="ctr" defTabSz="914400" rtl="0" eaLnBrk="1" latinLnBrk="0" hangingPunct="1">
+                <a:lnSpc>
+                  <a:spcPct val="90000"/>
+                </a:lnSpc>
+                <a:spcBef>
+                  <a:spcPts val="500"/>
+                </a:spcBef>
+                <a:buFont typeface="Arial" panose="020B0604020202020204" pitchFamily="34" charset="0"/>
+                <a:buNone/>
+                <a:defRPr sz="1600" kern="1200">
+                  <a:solidFill>
+                    <a:schemeClr val="tx1"/>
+                  </a:solidFill>
+                  <a:latin typeface="+mn-lt"/>
+                  <a:ea typeface="+mn-ea"/>
+                  <a:cs typeface="+mn-cs"/>
+                </a:defRPr>
+              </a:lvl5pPr>
+              <a:lvl6pPr marL="2286000" indent="0" algn="ctr" defTabSz="914400" rtl="0" eaLnBrk="1" latinLnBrk="0" hangingPunct="1">
+                <a:lnSpc>
+                  <a:spcPct val="90000"/>
+                </a:lnSpc>
+                <a:spcBef>
+                  <a:spcPts val="500"/>
+                </a:spcBef>
+                <a:buFont typeface="Arial" panose="020B0604020202020204" pitchFamily="34" charset="0"/>
+                <a:buNone/>
+                <a:defRPr sz="1600" kern="1200">
+                  <a:solidFill>
+                    <a:schemeClr val="tx1"/>
+                  </a:solidFill>
+                  <a:latin typeface="+mn-lt"/>
+                  <a:ea typeface="+mn-ea"/>
+                  <a:cs typeface="+mn-cs"/>
+                </a:defRPr>
+              </a:lvl6pPr>
+              <a:lvl7pPr marL="2743200" indent="0" algn="ctr" defTabSz="914400" rtl="0" eaLnBrk="1" latinLnBrk="0" hangingPunct="1">
+                <a:lnSpc>
+                  <a:spcPct val="90000"/>
+                </a:lnSpc>
+                <a:spcBef>
+                  <a:spcPts val="500"/>
+                </a:spcBef>
+                <a:buFont typeface="Arial" panose="020B0604020202020204" pitchFamily="34" charset="0"/>
+                <a:buNone/>
+                <a:defRPr sz="1600" kern="1200">
+                  <a:solidFill>
+                    <a:schemeClr val="tx1"/>
+                  </a:solidFill>
+                  <a:latin typeface="+mn-lt"/>
+                  <a:ea typeface="+mn-ea"/>
+                  <a:cs typeface="+mn-cs"/>
+                </a:defRPr>
+              </a:lvl7pPr>
+              <a:lvl8pPr marL="3200400" indent="0" algn="ctr" defTabSz="914400" rtl="0" eaLnBrk="1" latinLnBrk="0" hangingPunct="1">
+                <a:lnSpc>
+                  <a:spcPct val="90000"/>
+                </a:lnSpc>
+                <a:spcBef>
+                  <a:spcPts val="500"/>
+                </a:spcBef>
+                <a:buFont typeface="Arial" panose="020B0604020202020204" pitchFamily="34" charset="0"/>
+                <a:buNone/>
+                <a:defRPr sz="1600" kern="1200">
+                  <a:solidFill>
+                    <a:schemeClr val="tx1"/>
+                  </a:solidFill>
+                  <a:latin typeface="+mn-lt"/>
+                  <a:ea typeface="+mn-ea"/>
+                  <a:cs typeface="+mn-cs"/>
+                </a:defRPr>
+              </a:lvl8pPr>
+              <a:lvl9pPr marL="3657600" indent="0" algn="ctr" defTabSz="914400" rtl="0" eaLnBrk="1" latinLnBrk="0" hangingPunct="1">
+                <a:lnSpc>
+                  <a:spcPct val="90000"/>
+                </a:lnSpc>
+                <a:spcBef>
+                  <a:spcPts val="500"/>
+                </a:spcBef>
+                <a:buFont typeface="Arial" panose="020B0604020202020204" pitchFamily="34" charset="0"/>
+                <a:buNone/>
+                <a:defRPr sz="1600" kern="1200">
+                  <a:solidFill>
+                    <a:schemeClr val="tx1"/>
+                  </a:solidFill>
+                  <a:latin typeface="+mn-lt"/>
+                  <a:ea typeface="+mn-ea"/>
+                  <a:cs typeface="+mn-cs"/>
+                </a:defRPr>
+              </a:lvl9pPr>
+            </a:lstStyle>
+            <a:p>
+              <a:r>
+                <a:rPr lang="en-US" dirty="0"/>
+                <a:t>Team </a:t>
+              </a:r>
+              <a:r>
+                <a:rPr lang="en-KR" dirty="0"/>
+                <a:t>TCPs</a:t>
+              </a:r>
+              <a:br>
+                <a:rPr lang="en-US" dirty="0"/>
+              </a:br>
+              <a:r>
+                <a:rPr lang="en-US" sz="2000" dirty="0"/>
+                <a:t>20200854 Hwang</a:t>
+              </a:r>
+              <a:r>
+                <a:rPr lang="ko-KR" altLang="en-US" sz="2000" dirty="0"/>
+                <a:t> </a:t>
+              </a:r>
+              <a:r>
+                <a:rPr lang="en-US" altLang="ko-KR" sz="2000" dirty="0" err="1"/>
+                <a:t>Chanki</a:t>
+              </a:r>
+              <a:r>
+                <a:rPr lang="ko-KR" altLang="en-US" sz="2000" dirty="0"/>
+                <a:t> </a:t>
+              </a:r>
+              <a:r>
+                <a:rPr lang="en-US" altLang="ko-KR" sz="2000" dirty="0"/>
+                <a:t>/</a:t>
+              </a:r>
+              <a:r>
+                <a:rPr lang="ko-KR" altLang="en-US" sz="2000" dirty="0"/>
+                <a:t> </a:t>
+              </a:r>
+              <a:r>
+                <a:rPr lang="en-US" altLang="ko-KR" sz="2000" dirty="0"/>
+                <a:t>20220140 Kim Taeyeon</a:t>
+              </a:r>
+              <a:endParaRPr lang="en-KR" sz="2000" dirty="0"/>
+            </a:p>
+            <a:p>
+              <a:endParaRPr lang="en-KR" dirty="0"/>
+            </a:p>
+          </p:txBody>
+        </p:sp>
+      </p:grpSp>
     </p:spTree>
     <p:extLst>
       <p:ext uri="{BB962C8B-B14F-4D97-AF65-F5344CB8AC3E}">
@@ -3471,7 +4366,12 @@
             <p:ph type="title"/>
           </p:nvPr>
         </p:nvSpPr>
-        <p:spPr/>
+        <p:spPr>
+          <a:xfrm>
+            <a:off x="483094" y="246031"/>
+            <a:ext cx="2508682" cy="1009651"/>
+          </a:xfrm>
+        </p:spPr>
         <p:txBody>
           <a:bodyPr/>
           <a:lstStyle/>
@@ -3505,31 +4405,37 @@
           <a:lstStyle/>
           <a:p>
             <a:r>
-              <a:rPr lang="ko-KR" altLang="en-US" dirty="0"/>
-              <a:t>문제 상황</a:t>
-            </a:r>
-            <a:endParaRPr lang="en-KR" dirty="0"/>
-          </a:p>
-          <a:p>
-            <a:r>
-              <a:rPr lang="ko-KR" altLang="en-US" dirty="0"/>
-              <a:t>아이디어</a:t>
-            </a:r>
-            <a:endParaRPr lang="en-KR" dirty="0"/>
-          </a:p>
-          <a:p>
-            <a:r>
-              <a:rPr lang="ko-KR" altLang="en-US" dirty="0"/>
-              <a:t>어떻게 구현하면 될까</a:t>
-            </a:r>
-            <a:endParaRPr lang="en-US" altLang="ko-KR" dirty="0"/>
-          </a:p>
-          <a:p>
-            <a:r>
-              <a:rPr lang="ko-KR" altLang="en-US" dirty="0"/>
-              <a:t>기대효과</a:t>
-            </a:r>
-            <a:endParaRPr lang="en-US" altLang="ko-KR" dirty="0"/>
+              <a:rPr lang="en-US" altLang="ko-KR" sz="3500" dirty="0"/>
+              <a:t>Ideation</a:t>
+            </a:r>
+            <a:endParaRPr lang="en-KR" sz="3500" dirty="0"/>
+          </a:p>
+          <a:p>
+            <a:r>
+              <a:rPr lang="en-US" sz="3500" dirty="0"/>
+              <a:t>Basic</a:t>
+            </a:r>
+            <a:r>
+              <a:rPr lang="ko-KR" altLang="en-US" sz="3500" dirty="0"/>
+              <a:t> </a:t>
+            </a:r>
+            <a:r>
+              <a:rPr lang="en-US" altLang="ko-KR" sz="3500" dirty="0"/>
+              <a:t>Concepts</a:t>
+            </a:r>
+            <a:endParaRPr lang="en-KR" sz="3500" dirty="0"/>
+          </a:p>
+          <a:p>
+            <a:r>
+              <a:rPr lang="en-US" altLang="ko-KR" sz="3500" dirty="0"/>
+              <a:t>How?</a:t>
+            </a:r>
+          </a:p>
+          <a:p>
+            <a:r>
+              <a:rPr lang="en-US" altLang="ko-KR" sz="3500" dirty="0"/>
+              <a:t>Effects</a:t>
+            </a:r>
           </a:p>
           <a:p>
             <a:endParaRPr lang="en-KR" dirty="0"/>
@@ -3554,6 +4460,170 @@
   <p:cSld>
     <p:spTree>
       <p:nvGrpSpPr>
+        <p:cNvPr id="1" name="">
+          <a:extLst>
+            <a:ext uri="{FF2B5EF4-FFF2-40B4-BE49-F238E27FC236}">
+              <a16:creationId xmlns:a16="http://schemas.microsoft.com/office/drawing/2014/main" id="{99ED38A5-820D-010F-9A0A-79626CA26794}"/>
+            </a:ext>
+          </a:extLst>
+        </p:cNvPr>
+        <p:cNvGrpSpPr/>
+        <p:nvPr/>
+      </p:nvGrpSpPr>
+      <p:grpSpPr>
+        <a:xfrm>
+          <a:off x="0" y="0"/>
+          <a:ext cx="0" cy="0"/>
+          <a:chOff x="0" y="0"/>
+          <a:chExt cx="0" cy="0"/>
+        </a:xfrm>
+      </p:grpSpPr>
+      <p:pic>
+        <p:nvPicPr>
+          <p:cNvPr id="2050" name="Picture 2" descr="포스플렉스, 지역 생활 스포츠를 선도하다 &lt; 기획 &lt; 기사본문 - 대경일보">
+            <a:extLst>
+              <a:ext uri="{FF2B5EF4-FFF2-40B4-BE49-F238E27FC236}">
+                <a16:creationId xmlns:a16="http://schemas.microsoft.com/office/drawing/2014/main" id="{55056FED-69D4-9D47-0522-E086E450CE8B}"/>
+              </a:ext>
+            </a:extLst>
+          </p:cNvPr>
+          <p:cNvPicPr>
+            <a:picLocks noChangeAspect="1" noChangeArrowheads="1"/>
+          </p:cNvPicPr>
+          <p:nvPr/>
+        </p:nvPicPr>
+        <p:blipFill>
+          <a:blip r:embed="rId3">
+            <a:extLst>
+              <a:ext uri="{28A0092B-C50C-407E-A947-70E740481C1C}">
+                <a14:useLocalDpi xmlns:a14="http://schemas.microsoft.com/office/drawing/2010/main" val="0"/>
+              </a:ext>
+            </a:extLst>
+          </a:blip>
+          <a:srcRect/>
+          <a:stretch>
+            <a:fillRect/>
+          </a:stretch>
+        </p:blipFill>
+        <p:spPr bwMode="auto">
+          <a:xfrm>
+            <a:off x="983572" y="2086253"/>
+            <a:ext cx="4640840" cy="3078424"/>
+          </a:xfrm>
+          <a:prstGeom prst="rect">
+            <a:avLst/>
+          </a:prstGeom>
+          <a:noFill/>
+          <a:extLst>
+            <a:ext uri="{909E8E84-426E-40DD-AFC4-6F175D3DCCD1}">
+              <a14:hiddenFill xmlns:a14="http://schemas.microsoft.com/office/drawing/2010/main">
+                <a:solidFill>
+                  <a:srgbClr val="FFFFFF"/>
+                </a:solidFill>
+              </a14:hiddenFill>
+            </a:ext>
+          </a:extLst>
+        </p:spPr>
+      </p:pic>
+      <p:sp>
+        <p:nvSpPr>
+          <p:cNvPr id="7" name="Title 1">
+            <a:extLst>
+              <a:ext uri="{FF2B5EF4-FFF2-40B4-BE49-F238E27FC236}">
+                <a16:creationId xmlns:a16="http://schemas.microsoft.com/office/drawing/2014/main" id="{325E57FF-E744-EA8B-C340-788D7D3776DE}"/>
+              </a:ext>
+            </a:extLst>
+          </p:cNvPr>
+          <p:cNvSpPr>
+            <a:spLocks noGrp="1"/>
+          </p:cNvSpPr>
+          <p:nvPr>
+            <p:ph type="title"/>
+          </p:nvPr>
+        </p:nvSpPr>
+        <p:spPr>
+          <a:xfrm>
+            <a:off x="483094" y="246031"/>
+            <a:ext cx="2508682" cy="1009651"/>
+          </a:xfrm>
+        </p:spPr>
+        <p:txBody>
+          <a:bodyPr/>
+          <a:lstStyle/>
+          <a:p>
+            <a:r>
+              <a:rPr lang="en-US" dirty="0"/>
+              <a:t>Ideation</a:t>
+            </a:r>
+            <a:endParaRPr lang="en-KR" dirty="0"/>
+          </a:p>
+        </p:txBody>
+      </p:sp>
+      <p:pic>
+        <p:nvPicPr>
+          <p:cNvPr id="2052" name="Picture 4" descr="유튜브 - 나무위키">
+            <a:extLst>
+              <a:ext uri="{FF2B5EF4-FFF2-40B4-BE49-F238E27FC236}">
+                <a16:creationId xmlns:a16="http://schemas.microsoft.com/office/drawing/2014/main" id="{43A0B3D5-10E5-BEB0-1DF8-A5AE2ABF91DF}"/>
+              </a:ext>
+            </a:extLst>
+          </p:cNvPr>
+          <p:cNvPicPr>
+            <a:picLocks noChangeAspect="1" noChangeArrowheads="1"/>
+          </p:cNvPicPr>
+          <p:nvPr/>
+        </p:nvPicPr>
+        <p:blipFill>
+          <a:blip r:embed="rId4">
+            <a:extLst>
+              <a:ext uri="{28A0092B-C50C-407E-A947-70E740481C1C}">
+                <a14:useLocalDpi xmlns:a14="http://schemas.microsoft.com/office/drawing/2010/main" val="0"/>
+              </a:ext>
+            </a:extLst>
+          </a:blip>
+          <a:srcRect/>
+          <a:stretch>
+            <a:fillRect/>
+          </a:stretch>
+        </p:blipFill>
+        <p:spPr bwMode="auto">
+          <a:xfrm>
+            <a:off x="6567590" y="3120640"/>
+            <a:ext cx="4524375" cy="1009650"/>
+          </a:xfrm>
+          <a:prstGeom prst="rect">
+            <a:avLst/>
+          </a:prstGeom>
+          <a:noFill/>
+          <a:extLst>
+            <a:ext uri="{909E8E84-426E-40DD-AFC4-6F175D3DCCD1}">
+              <a14:hiddenFill xmlns:a14="http://schemas.microsoft.com/office/drawing/2010/main">
+                <a:solidFill>
+                  <a:srgbClr val="FFFFFF"/>
+                </a:solidFill>
+              </a14:hiddenFill>
+            </a:ext>
+          </a:extLst>
+        </p:spPr>
+      </p:pic>
+    </p:spTree>
+    <p:extLst>
+      <p:ext uri="{BB962C8B-B14F-4D97-AF65-F5344CB8AC3E}">
+        <p14:creationId xmlns:p14="http://schemas.microsoft.com/office/powerpoint/2010/main" val="1520696444"/>
+      </p:ext>
+    </p:extLst>
+  </p:cSld>
+  <p:clrMapOvr>
+    <a:masterClrMapping/>
+  </p:clrMapOvr>
+</p:sld>
+</file>
+
+<file path=ppt/slides/slide4.xml><?xml version="1.0" encoding="utf-8"?>
+<p:sld xmlns:a="http://schemas.openxmlformats.org/drawingml/2006/main" xmlns:r="http://schemas.openxmlformats.org/officeDocument/2006/relationships" xmlns:p="http://schemas.openxmlformats.org/presentationml/2006/main">
+  <p:cSld>
+    <p:spTree>
+      <p:nvGrpSpPr>
         <p:cNvPr id="1" name=""/>
         <p:cNvGrpSpPr/>
         <p:nvPr/>
@@ -3566,60 +4636,189 @@
           <a:chExt cx="0" cy="0"/>
         </a:xfrm>
       </p:grpSpPr>
-      <p:sp>
-        <p:nvSpPr>
-          <p:cNvPr id="2" name="Title 1">
-            <a:extLst>
-              <a:ext uri="{FF2B5EF4-FFF2-40B4-BE49-F238E27FC236}">
-                <a16:creationId xmlns:a16="http://schemas.microsoft.com/office/drawing/2014/main" id="{C5AEE393-A835-F244-2AB3-77B88B57E7DC}"/>
-              </a:ext>
-            </a:extLst>
-          </p:cNvPr>
-          <p:cNvSpPr>
-            <a:spLocks noGrp="1"/>
-          </p:cNvSpPr>
-          <p:nvPr>
-            <p:ph type="title"/>
-          </p:nvPr>
-        </p:nvSpPr>
-        <p:spPr/>
-        <p:txBody>
-          <a:bodyPr/>
-          <a:lstStyle/>
-          <a:p>
-            <a:r>
-              <a:rPr lang="ko-KR" altLang="en-US" dirty="0"/>
-              <a:t>문제 상황</a:t>
+      <p:pic>
+        <p:nvPicPr>
+          <p:cNvPr id="1026" name="Picture 2" descr="Samsung Galaxy S24 | Visible">
+            <a:extLst>
+              <a:ext uri="{FF2B5EF4-FFF2-40B4-BE49-F238E27FC236}">
+                <a16:creationId xmlns:a16="http://schemas.microsoft.com/office/drawing/2014/main" id="{A28D2BCB-F417-7485-6960-774397562647}"/>
+              </a:ext>
+            </a:extLst>
+          </p:cNvPr>
+          <p:cNvPicPr>
+            <a:picLocks noChangeAspect="1" noChangeArrowheads="1"/>
+          </p:cNvPicPr>
+          <p:nvPr/>
+        </p:nvPicPr>
+        <p:blipFill>
+          <a:blip r:embed="rId3">
+            <a:extLst>
+              <a:ext uri="{BEBA8EAE-BF5A-486C-A8C5-ECC9F3942E4B}">
+                <a14:imgProps xmlns:a14="http://schemas.microsoft.com/office/drawing/2010/main">
+                  <a14:imgLayer r:embed="rId4">
+                    <a14:imgEffect>
+                      <a14:backgroundRemoval t="10000" b="90000" l="10000" r="90000"/>
+                    </a14:imgEffect>
+                  </a14:imgLayer>
+                </a14:imgProps>
+              </a:ext>
+              <a:ext uri="{28A0092B-C50C-407E-A947-70E740481C1C}">
+                <a14:useLocalDpi xmlns:a14="http://schemas.microsoft.com/office/drawing/2010/main" val="0"/>
+              </a:ext>
+            </a:extLst>
+          </a:blip>
+          <a:srcRect/>
+          <a:stretch>
+            <a:fillRect/>
+          </a:stretch>
+        </p:blipFill>
+        <p:spPr bwMode="auto">
+          <a:xfrm>
+            <a:off x="4003089" y="1690688"/>
+            <a:ext cx="4185821" cy="4185821"/>
+          </a:xfrm>
+          <a:prstGeom prst="rect">
+            <a:avLst/>
+          </a:prstGeom>
+          <a:noFill/>
+          <a:extLst>
+            <a:ext uri="{909E8E84-426E-40DD-AFC4-6F175D3DCCD1}">
+              <a14:hiddenFill xmlns:a14="http://schemas.microsoft.com/office/drawing/2010/main">
+                <a:solidFill>
+                  <a:srgbClr val="FFFFFF"/>
+                </a:solidFill>
+              </a14:hiddenFill>
+            </a:ext>
+          </a:extLst>
+        </p:spPr>
+      </p:pic>
+      <p:pic>
+        <p:nvPicPr>
+          <p:cNvPr id="5" name="그래픽 4" descr="개수">
+            <a:extLst>
+              <a:ext uri="{FF2B5EF4-FFF2-40B4-BE49-F238E27FC236}">
+                <a16:creationId xmlns:a16="http://schemas.microsoft.com/office/drawing/2014/main" id="{2C9EC93A-DCB1-9629-6BDA-0A0714622714}"/>
+              </a:ext>
+            </a:extLst>
+          </p:cNvPr>
+          <p:cNvPicPr>
+            <a:picLocks noChangeAspect="1"/>
+          </p:cNvPicPr>
+          <p:nvPr/>
+        </p:nvPicPr>
+        <p:blipFill>
+          <a:blip r:embed="rId5">
+            <a:extLst>
+              <a:ext uri="{96DAC541-7B7A-43D3-8B79-37D633B846F1}">
+                <asvg:svgBlip xmlns:asvg="http://schemas.microsoft.com/office/drawing/2016/SVG/main" r:embed="rId6"/>
+              </a:ext>
+            </a:extLst>
+          </a:blip>
+          <a:stretch>
+            <a:fillRect/>
+          </a:stretch>
+        </p:blipFill>
+        <p:spPr>
+          <a:xfrm>
+            <a:off x="2780190" y="3202620"/>
+            <a:ext cx="914400" cy="914400"/>
+          </a:xfrm>
+          <a:prstGeom prst="rect">
+            <a:avLst/>
+          </a:prstGeom>
+        </p:spPr>
+      </p:pic>
+      <p:sp>
+        <p:nvSpPr>
+          <p:cNvPr id="8" name="Title 1">
+            <a:extLst>
+              <a:ext uri="{FF2B5EF4-FFF2-40B4-BE49-F238E27FC236}">
+                <a16:creationId xmlns:a16="http://schemas.microsoft.com/office/drawing/2014/main" id="{DA9473EF-B424-BC0C-4B10-64061909331B}"/>
+              </a:ext>
+            </a:extLst>
+          </p:cNvPr>
+          <p:cNvSpPr txBox="1">
+            <a:spLocks/>
+          </p:cNvSpPr>
+          <p:nvPr/>
+        </p:nvSpPr>
+        <p:spPr>
+          <a:xfrm>
+            <a:off x="483094" y="246031"/>
+            <a:ext cx="2508682" cy="1009651"/>
+          </a:xfrm>
+          <a:prstGeom prst="rect">
+            <a:avLst/>
+          </a:prstGeom>
+        </p:spPr>
+        <p:txBody>
+          <a:bodyPr vert="horz" lIns="91440" tIns="45720" rIns="91440" bIns="45720" rtlCol="0" anchor="ctr">
+            <a:normAutofit/>
+          </a:bodyPr>
+          <a:lstStyle>
+            <a:lvl1pPr algn="l" defTabSz="914400" rtl="0" eaLnBrk="1" latinLnBrk="0" hangingPunct="1">
+              <a:lnSpc>
+                <a:spcPct val="90000"/>
+              </a:lnSpc>
+              <a:spcBef>
+                <a:spcPct val="0"/>
+              </a:spcBef>
+              <a:buNone/>
+              <a:defRPr sz="4400" kern="1200">
+                <a:solidFill>
+                  <a:schemeClr val="tx1"/>
+                </a:solidFill>
+                <a:latin typeface="+mj-lt"/>
+                <a:ea typeface="+mj-ea"/>
+                <a:cs typeface="+mj-cs"/>
+              </a:defRPr>
+            </a:lvl1pPr>
+          </a:lstStyle>
+          <a:p>
+            <a:r>
+              <a:rPr lang="en-US"/>
+              <a:t>Ideation</a:t>
             </a:r>
             <a:endParaRPr lang="en-KR" dirty="0"/>
           </a:p>
         </p:txBody>
       </p:sp>
-      <p:sp>
-        <p:nvSpPr>
-          <p:cNvPr id="3" name="Content Placeholder 2">
-            <a:extLst>
-              <a:ext uri="{FF2B5EF4-FFF2-40B4-BE49-F238E27FC236}">
-                <a16:creationId xmlns:a16="http://schemas.microsoft.com/office/drawing/2014/main" id="{D1B8C18C-3BD9-7B34-7078-BE852761D366}"/>
-              </a:ext>
-            </a:extLst>
-          </p:cNvPr>
-          <p:cNvSpPr>
-            <a:spLocks noGrp="1"/>
-          </p:cNvSpPr>
-          <p:nvPr>
-            <p:ph idx="1"/>
-          </p:nvPr>
-        </p:nvSpPr>
-        <p:spPr/>
-        <p:txBody>
-          <a:bodyPr/>
-          <a:lstStyle/>
-          <a:p>
-            <a:endParaRPr lang="en-KR"/>
-          </a:p>
-        </p:txBody>
-      </p:sp>
+      <p:pic>
+        <p:nvPicPr>
+          <p:cNvPr id="12" name="그래픽 11" descr="비디오 카메라">
+            <a:extLst>
+              <a:ext uri="{FF2B5EF4-FFF2-40B4-BE49-F238E27FC236}">
+                <a16:creationId xmlns:a16="http://schemas.microsoft.com/office/drawing/2014/main" id="{6DF4A90E-40BD-B9E6-82CB-448E613B692A}"/>
+              </a:ext>
+            </a:extLst>
+          </p:cNvPr>
+          <p:cNvPicPr>
+            <a:picLocks noChangeAspect="1"/>
+          </p:cNvPicPr>
+          <p:nvPr/>
+        </p:nvPicPr>
+        <p:blipFill>
+          <a:blip r:embed="rId7">
+            <a:extLst>
+              <a:ext uri="{96DAC541-7B7A-43D3-8B79-37D633B846F1}">
+                <asvg:svgBlip xmlns:asvg="http://schemas.microsoft.com/office/drawing/2016/SVG/main" r:embed="rId8"/>
+              </a:ext>
+            </a:extLst>
+          </a:blip>
+          <a:stretch>
+            <a:fillRect/>
+          </a:stretch>
+        </p:blipFill>
+        <p:spPr>
+          <a:xfrm>
+            <a:off x="8497410" y="3202620"/>
+            <a:ext cx="914400" cy="914400"/>
+          </a:xfrm>
+          <a:prstGeom prst="rect">
+            <a:avLst/>
+          </a:prstGeom>
+        </p:spPr>
+      </p:pic>
     </p:spTree>
     <p:extLst>
       <p:ext uri="{BB962C8B-B14F-4D97-AF65-F5344CB8AC3E}">
@@ -3633,7 +4832,151 @@
 </p:sld>
 </file>
 
-<file path=ppt/slides/slide4.xml><?xml version="1.0" encoding="utf-8"?>
+<file path=ppt/slides/slide5.xml><?xml version="1.0" encoding="utf-8"?>
+<p:sld xmlns:a="http://schemas.openxmlformats.org/drawingml/2006/main" xmlns:r="http://schemas.openxmlformats.org/officeDocument/2006/relationships" xmlns:p="http://schemas.openxmlformats.org/presentationml/2006/main">
+  <p:cSld>
+    <p:spTree>
+      <p:nvGrpSpPr>
+        <p:cNvPr id="1" name="">
+          <a:extLst>
+            <a:ext uri="{FF2B5EF4-FFF2-40B4-BE49-F238E27FC236}">
+              <a16:creationId xmlns:a16="http://schemas.microsoft.com/office/drawing/2014/main" id="{51CA57CA-78FB-795A-89CA-23189C769DAC}"/>
+            </a:ext>
+          </a:extLst>
+        </p:cNvPr>
+        <p:cNvGrpSpPr/>
+        <p:nvPr/>
+      </p:nvGrpSpPr>
+      <p:grpSpPr>
+        <a:xfrm>
+          <a:off x="0" y="0"/>
+          <a:ext cx="0" cy="0"/>
+          <a:chOff x="0" y="0"/>
+          <a:chExt cx="0" cy="0"/>
+        </a:xfrm>
+      </p:grpSpPr>
+      <p:sp>
+        <p:nvSpPr>
+          <p:cNvPr id="8" name="Title 1">
+            <a:extLst>
+              <a:ext uri="{FF2B5EF4-FFF2-40B4-BE49-F238E27FC236}">
+                <a16:creationId xmlns:a16="http://schemas.microsoft.com/office/drawing/2014/main" id="{40BEB1CF-170E-A117-92F5-65CD33F6AB8D}"/>
+              </a:ext>
+            </a:extLst>
+          </p:cNvPr>
+          <p:cNvSpPr txBox="1">
+            <a:spLocks/>
+          </p:cNvSpPr>
+          <p:nvPr/>
+        </p:nvSpPr>
+        <p:spPr>
+          <a:xfrm>
+            <a:off x="483094" y="246031"/>
+            <a:ext cx="2508682" cy="1009651"/>
+          </a:xfrm>
+          <a:prstGeom prst="rect">
+            <a:avLst/>
+          </a:prstGeom>
+        </p:spPr>
+        <p:txBody>
+          <a:bodyPr vert="horz" lIns="91440" tIns="45720" rIns="91440" bIns="45720" rtlCol="0" anchor="ctr">
+            <a:normAutofit/>
+          </a:bodyPr>
+          <a:lstStyle>
+            <a:lvl1pPr algn="l" defTabSz="914400" rtl="0" eaLnBrk="1" latinLnBrk="0" hangingPunct="1">
+              <a:lnSpc>
+                <a:spcPct val="90000"/>
+              </a:lnSpc>
+              <a:spcBef>
+                <a:spcPct val="0"/>
+              </a:spcBef>
+              <a:buNone/>
+              <a:defRPr sz="4400" kern="1200">
+                <a:solidFill>
+                  <a:schemeClr val="tx1"/>
+                </a:solidFill>
+                <a:latin typeface="+mj-lt"/>
+                <a:ea typeface="+mj-ea"/>
+                <a:cs typeface="+mj-cs"/>
+              </a:defRPr>
+            </a:lvl1pPr>
+          </a:lstStyle>
+          <a:p>
+            <a:r>
+              <a:rPr lang="en-US"/>
+              <a:t>Ideation</a:t>
+            </a:r>
+            <a:endParaRPr lang="en-KR" dirty="0"/>
+          </a:p>
+        </p:txBody>
+      </p:sp>
+      <p:sp>
+        <p:nvSpPr>
+          <p:cNvPr id="2" name="TextBox 1">
+            <a:extLst>
+              <a:ext uri="{FF2B5EF4-FFF2-40B4-BE49-F238E27FC236}">
+                <a16:creationId xmlns:a16="http://schemas.microsoft.com/office/drawing/2014/main" id="{D7943355-533F-82FB-DB22-1B8C1E56A83D}"/>
+              </a:ext>
+            </a:extLst>
+          </p:cNvPr>
+          <p:cNvSpPr txBox="1"/>
+          <p:nvPr/>
+        </p:nvSpPr>
+        <p:spPr>
+          <a:xfrm>
+            <a:off x="2451716" y="2531901"/>
+            <a:ext cx="7288567" cy="369332"/>
+          </a:xfrm>
+          <a:prstGeom prst="rect">
+            <a:avLst/>
+          </a:prstGeom>
+          <a:noFill/>
+        </p:spPr>
+        <p:txBody>
+          <a:bodyPr wrap="square" rtlCol="0">
+            <a:spAutoFit/>
+          </a:bodyPr>
+          <a:lstStyle/>
+          <a:p>
+            <a:pPr algn="ctr"/>
+            <a:r>
+              <a:rPr lang="en-US" altLang="ko-KR" dirty="0"/>
+              <a:t>(</a:t>
+            </a:r>
+            <a:r>
+              <a:rPr lang="ko-KR" altLang="en-US" dirty="0"/>
+              <a:t>대충 </a:t>
+            </a:r>
+            <a:r>
+              <a:rPr lang="en-US" altLang="ko-KR" dirty="0"/>
+              <a:t>Wii Fit / Wii Sports </a:t>
+            </a:r>
+            <a:r>
+              <a:rPr lang="ko-KR" altLang="en-US" dirty="0"/>
+              <a:t>하는 사진</a:t>
+            </a:r>
+            <a:r>
+              <a:rPr lang="en-US" altLang="ko-KR" dirty="0"/>
+              <a:t>)</a:t>
+            </a:r>
+            <a:endParaRPr lang="ko-KR" altLang="en-US" dirty="0"/>
+          </a:p>
+        </p:txBody>
+      </p:sp>
+    </p:spTree>
+    <p:extLst>
+      <p:ext uri="{BB962C8B-B14F-4D97-AF65-F5344CB8AC3E}">
+        <p14:creationId xmlns:p14="http://schemas.microsoft.com/office/powerpoint/2010/main" val="3636042560"/>
+      </p:ext>
+    </p:extLst>
+  </p:cSld>
+  <p:clrMapOvr>
+    <a:masterClrMapping/>
+  </p:clrMapOvr>
+</p:sld>
+</file>
+
+<file path=ppt/slides/slide6.xml><?xml version="1.0" encoding="utf-8"?>
 <p:sld xmlns:a="http://schemas.openxmlformats.org/drawingml/2006/main" xmlns:r="http://schemas.openxmlformats.org/officeDocument/2006/relationships" xmlns:p="http://schemas.openxmlformats.org/presentationml/2006/main">
   <p:cSld>
     <p:spTree>
@@ -3658,10 +5001,10 @@
       </p:grpSpPr>
       <p:sp>
         <p:nvSpPr>
-          <p:cNvPr id="2" name="Title 1">
-            <a:extLst>
-              <a:ext uri="{FF2B5EF4-FFF2-40B4-BE49-F238E27FC236}">
-                <a16:creationId xmlns:a16="http://schemas.microsoft.com/office/drawing/2014/main" id="{D220D01D-DA3A-B092-A6E4-2677152C96CE}"/>
+          <p:cNvPr id="6" name="Title 1">
+            <a:extLst>
+              <a:ext uri="{FF2B5EF4-FFF2-40B4-BE49-F238E27FC236}">
+                <a16:creationId xmlns:a16="http://schemas.microsoft.com/office/drawing/2014/main" id="{720C4EC2-C5BB-F11A-8278-99C5BB298275}"/>
               </a:ext>
             </a:extLst>
           </p:cNvPr>
@@ -3672,41 +5015,23 @@
             <p:ph type="title"/>
           </p:nvPr>
         </p:nvSpPr>
-        <p:spPr/>
-        <p:txBody>
-          <a:bodyPr/>
-          <a:lstStyle/>
-          <a:p>
-            <a:r>
-              <a:rPr lang="ko-KR" altLang="en-US" dirty="0"/>
-              <a:t>아이디어</a:t>
+        <p:spPr>
+          <a:xfrm>
+            <a:off x="483094" y="246031"/>
+            <a:ext cx="3556246" cy="1009651"/>
+          </a:xfrm>
+        </p:spPr>
+        <p:txBody>
+          <a:bodyPr>
+            <a:normAutofit fontScale="90000"/>
+          </a:bodyPr>
+          <a:lstStyle/>
+          <a:p>
+            <a:r>
+              <a:rPr lang="en-US" dirty="0"/>
+              <a:t>Basic Concepts</a:t>
             </a:r>
             <a:endParaRPr lang="en-KR" dirty="0"/>
-          </a:p>
-        </p:txBody>
-      </p:sp>
-      <p:sp>
-        <p:nvSpPr>
-          <p:cNvPr id="3" name="Content Placeholder 2">
-            <a:extLst>
-              <a:ext uri="{FF2B5EF4-FFF2-40B4-BE49-F238E27FC236}">
-                <a16:creationId xmlns:a16="http://schemas.microsoft.com/office/drawing/2014/main" id="{44BA730D-C389-60DA-FEFA-FBFF09CD0F3E}"/>
-              </a:ext>
-            </a:extLst>
-          </p:cNvPr>
-          <p:cNvSpPr>
-            <a:spLocks noGrp="1"/>
-          </p:cNvSpPr>
-          <p:nvPr>
-            <p:ph idx="1"/>
-          </p:nvPr>
-        </p:nvSpPr>
-        <p:spPr/>
-        <p:txBody>
-          <a:bodyPr/>
-          <a:lstStyle/>
-          <a:p>
-            <a:endParaRPr lang="en-KR"/>
           </a:p>
         </p:txBody>
       </p:sp>
@@ -3723,7 +5048,7 @@
 </p:sld>
 </file>
 
-<file path=ppt/slides/slide5.xml><?xml version="1.0" encoding="utf-8"?>
+<file path=ppt/slides/slide7.xml><?xml version="1.0" encoding="utf-8"?>
 <p:sld xmlns:a="http://schemas.openxmlformats.org/drawingml/2006/main" xmlns:r="http://schemas.openxmlformats.org/officeDocument/2006/relationships" xmlns:p="http://schemas.openxmlformats.org/presentationml/2006/main">
   <p:cSld>
     <p:spTree>
@@ -3748,10 +5073,10 @@
       </p:grpSpPr>
       <p:sp>
         <p:nvSpPr>
-          <p:cNvPr id="2" name="Title 1">
-            <a:extLst>
-              <a:ext uri="{FF2B5EF4-FFF2-40B4-BE49-F238E27FC236}">
-                <a16:creationId xmlns:a16="http://schemas.microsoft.com/office/drawing/2014/main" id="{A667A776-750E-415E-3028-D76BC5DE9C00}"/>
+          <p:cNvPr id="6" name="Title 1">
+            <a:extLst>
+              <a:ext uri="{FF2B5EF4-FFF2-40B4-BE49-F238E27FC236}">
+                <a16:creationId xmlns:a16="http://schemas.microsoft.com/office/drawing/2014/main" id="{1BB3EBE7-42FA-3813-9EB8-9AE04E21E775}"/>
               </a:ext>
             </a:extLst>
           </p:cNvPr>
@@ -3762,41 +5087,21 @@
             <p:ph type="title"/>
           </p:nvPr>
         </p:nvSpPr>
-        <p:spPr/>
-        <p:txBody>
-          <a:bodyPr/>
-          <a:lstStyle/>
-          <a:p>
-            <a:r>
-              <a:rPr lang="ko-KR" altLang="en-US" dirty="0"/>
-              <a:t>어떻게 구현하면 될까</a:t>
+        <p:spPr>
+          <a:xfrm>
+            <a:off x="483094" y="246031"/>
+            <a:ext cx="2508682" cy="1009651"/>
+          </a:xfrm>
+        </p:spPr>
+        <p:txBody>
+          <a:bodyPr/>
+          <a:lstStyle/>
+          <a:p>
+            <a:r>
+              <a:rPr lang="en-US" dirty="0"/>
+              <a:t>How?</a:t>
             </a:r>
             <a:endParaRPr lang="en-KR" dirty="0"/>
-          </a:p>
-        </p:txBody>
-      </p:sp>
-      <p:sp>
-        <p:nvSpPr>
-          <p:cNvPr id="3" name="Content Placeholder 2">
-            <a:extLst>
-              <a:ext uri="{FF2B5EF4-FFF2-40B4-BE49-F238E27FC236}">
-                <a16:creationId xmlns:a16="http://schemas.microsoft.com/office/drawing/2014/main" id="{83B35F95-66F5-7639-0715-F4BEC9BD2DA0}"/>
-              </a:ext>
-            </a:extLst>
-          </p:cNvPr>
-          <p:cNvSpPr>
-            <a:spLocks noGrp="1"/>
-          </p:cNvSpPr>
-          <p:nvPr>
-            <p:ph idx="1"/>
-          </p:nvPr>
-        </p:nvSpPr>
-        <p:spPr/>
-        <p:txBody>
-          <a:bodyPr/>
-          <a:lstStyle/>
-          <a:p>
-            <a:endParaRPr lang="en-KR"/>
           </a:p>
         </p:txBody>
       </p:sp>
@@ -3813,7 +5118,7 @@
 </p:sld>
 </file>
 
-<file path=ppt/slides/slide6.xml><?xml version="1.0" encoding="utf-8"?>
+<file path=ppt/slides/slide8.xml><?xml version="1.0" encoding="utf-8"?>
 <p:sld xmlns:a="http://schemas.openxmlformats.org/drawingml/2006/main" xmlns:r="http://schemas.openxmlformats.org/officeDocument/2006/relationships" xmlns:p="http://schemas.openxmlformats.org/presentationml/2006/main">
   <p:cSld>
     <p:spTree>
@@ -3838,10 +5143,10 @@
       </p:grpSpPr>
       <p:sp>
         <p:nvSpPr>
-          <p:cNvPr id="2" name="Title 1">
-            <a:extLst>
-              <a:ext uri="{FF2B5EF4-FFF2-40B4-BE49-F238E27FC236}">
-                <a16:creationId xmlns:a16="http://schemas.microsoft.com/office/drawing/2014/main" id="{42C13E2D-2910-91DC-5315-8AEFB12BA6A3}"/>
+          <p:cNvPr id="6" name="Title 1">
+            <a:extLst>
+              <a:ext uri="{FF2B5EF4-FFF2-40B4-BE49-F238E27FC236}">
+                <a16:creationId xmlns:a16="http://schemas.microsoft.com/office/drawing/2014/main" id="{B9FFCBC4-1FFB-E630-1E97-50F8A194811D}"/>
               </a:ext>
             </a:extLst>
           </p:cNvPr>
@@ -3852,40 +5157,20 @@
             <p:ph type="title"/>
           </p:nvPr>
         </p:nvSpPr>
-        <p:spPr/>
-        <p:txBody>
-          <a:bodyPr/>
-          <a:lstStyle/>
-          <a:p>
-            <a:r>
-              <a:rPr lang="ko-KR" altLang="en-US" dirty="0"/>
-              <a:t>기대효과</a:t>
-            </a:r>
-            <a:endParaRPr lang="en-KR" dirty="0"/>
-          </a:p>
-        </p:txBody>
-      </p:sp>
-      <p:sp>
-        <p:nvSpPr>
-          <p:cNvPr id="3" name="Content Placeholder 2">
-            <a:extLst>
-              <a:ext uri="{FF2B5EF4-FFF2-40B4-BE49-F238E27FC236}">
-                <a16:creationId xmlns:a16="http://schemas.microsoft.com/office/drawing/2014/main" id="{A52F8F00-4F24-913F-CBB0-74C79F2A6663}"/>
-              </a:ext>
-            </a:extLst>
-          </p:cNvPr>
-          <p:cNvSpPr>
-            <a:spLocks noGrp="1"/>
-          </p:cNvSpPr>
-          <p:nvPr>
-            <p:ph idx="1"/>
-          </p:nvPr>
-        </p:nvSpPr>
-        <p:spPr/>
-        <p:txBody>
-          <a:bodyPr/>
-          <a:lstStyle/>
-          <a:p>
+        <p:spPr>
+          <a:xfrm>
+            <a:off x="483094" y="246031"/>
+            <a:ext cx="2508682" cy="1009651"/>
+          </a:xfrm>
+        </p:spPr>
+        <p:txBody>
+          <a:bodyPr/>
+          <a:lstStyle/>
+          <a:p>
+            <a:r>
+              <a:rPr lang="en-US" dirty="0"/>
+              <a:t>Effects</a:t>
+            </a:r>
             <a:endParaRPr lang="en-KR" dirty="0"/>
           </a:p>
         </p:txBody>
@@ -4216,4 +5501,299 @@
     </a:ext>
   </a:extLst>
 </a:theme>
+</file>
+
+<file path=ppt/theme/theme2.xml><?xml version="1.0" encoding="utf-8"?>
+<a:theme xmlns:a="http://schemas.openxmlformats.org/drawingml/2006/main" name="Office 테마">
+  <a:themeElements>
+    <a:clrScheme name="Office">
+      <a:dk1>
+        <a:sysClr val="windowText" lastClr="000000"/>
+      </a:dk1>
+      <a:lt1>
+        <a:sysClr val="window" lastClr="FFFFFF"/>
+      </a:lt1>
+      <a:dk2>
+        <a:srgbClr val="44546A"/>
+      </a:dk2>
+      <a:lt2>
+        <a:srgbClr val="E7E6E6"/>
+      </a:lt2>
+      <a:accent1>
+        <a:srgbClr val="4472C4"/>
+      </a:accent1>
+      <a:accent2>
+        <a:srgbClr val="ED7D31"/>
+      </a:accent2>
+      <a:accent3>
+        <a:srgbClr val="A5A5A5"/>
+      </a:accent3>
+      <a:accent4>
+        <a:srgbClr val="FFC000"/>
+      </a:accent4>
+      <a:accent5>
+        <a:srgbClr val="5B9BD5"/>
+      </a:accent5>
+      <a:accent6>
+        <a:srgbClr val="70AD47"/>
+      </a:accent6>
+      <a:hlink>
+        <a:srgbClr val="0563C1"/>
+      </a:hlink>
+      <a:folHlink>
+        <a:srgbClr val="954F72"/>
+      </a:folHlink>
+    </a:clrScheme>
+    <a:fontScheme name="Office">
+      <a:majorFont>
+        <a:latin typeface="맑은 고딕" panose="020F0302020204030204"/>
+        <a:ea typeface=""/>
+        <a:cs typeface=""/>
+        <a:font script="Jpan" typeface="游ゴシック Light"/>
+        <a:font script="Hang" typeface="맑은 고딕"/>
+        <a:font script="Hans" typeface="等线 Light"/>
+        <a:font script="Hant" typeface="新細明體"/>
+        <a:font script="Arab" typeface="Times New Roman"/>
+        <a:font script="Hebr" typeface="Times New Roman"/>
+        <a:font script="Thai" typeface="Angsana New"/>
+        <a:font script="Ethi" typeface="Nyala"/>
+        <a:font script="Beng" typeface="Vrinda"/>
+        <a:font script="Gujr" typeface="Shruti"/>
+        <a:font script="Khmr" typeface="MoolBoran"/>
+        <a:font script="Knda" typeface="Tunga"/>
+        <a:font script="Guru" typeface="Raavi"/>
+        <a:font script="Cans" typeface="Euphemia"/>
+        <a:font script="Cher" typeface="Plantagenet Cherokee"/>
+        <a:font script="Yiii" typeface="Microsoft Yi Baiti"/>
+        <a:font script="Tibt" typeface="Microsoft Himalaya"/>
+        <a:font script="Thaa" typeface="MV Boli"/>
+        <a:font script="Deva" typeface="Mangal"/>
+        <a:font script="Telu" typeface="Gautami"/>
+        <a:font script="Taml" typeface="Latha"/>
+        <a:font script="Syrc" typeface="Estrangelo Edessa"/>
+        <a:font script="Orya" typeface="Kalinga"/>
+        <a:font script="Mlym" typeface="Kartika"/>
+        <a:font script="Laoo" typeface="DokChampa"/>
+        <a:font script="Sinh" typeface="Iskoola Pota"/>
+        <a:font script="Mong" typeface="Mongolian Baiti"/>
+        <a:font script="Viet" typeface="Times New Roman"/>
+        <a:font script="Uigh" typeface="Microsoft Uighur"/>
+        <a:font script="Geor" typeface="Sylfaen"/>
+        <a:font script="Armn" typeface="Arial"/>
+        <a:font script="Bugi" typeface="Leelawadee UI"/>
+        <a:font script="Bopo" typeface="Microsoft JhengHei"/>
+        <a:font script="Java" typeface="Javanese Text"/>
+        <a:font script="Lisu" typeface="Segoe UI"/>
+        <a:font script="Mymr" typeface="Myanmar Text"/>
+        <a:font script="Nkoo" typeface="Ebrima"/>
+        <a:font script="Olck" typeface="Nirmala UI"/>
+        <a:font script="Osma" typeface="Ebrima"/>
+        <a:font script="Phag" typeface="Phagspa"/>
+        <a:font script="Syrn" typeface="Estrangelo Edessa"/>
+        <a:font script="Syrj" typeface="Estrangelo Edessa"/>
+        <a:font script="Syre" typeface="Estrangelo Edessa"/>
+        <a:font script="Sora" typeface="Nirmala UI"/>
+        <a:font script="Tale" typeface="Microsoft Tai Le"/>
+        <a:font script="Talu" typeface="Microsoft New Tai Lue"/>
+        <a:font script="Tfng" typeface="Ebrima"/>
+      </a:majorFont>
+      <a:minorFont>
+        <a:latin typeface="맑은 고딕" panose="020F0502020204030204"/>
+        <a:ea typeface=""/>
+        <a:cs typeface=""/>
+        <a:font script="Jpan" typeface="游ゴシック"/>
+        <a:font script="Hang" typeface="맑은 고딕"/>
+        <a:font script="Hans" typeface="等线"/>
+        <a:font script="Hant" typeface="新細明體"/>
+        <a:font script="Arab" typeface="Arial"/>
+        <a:font script="Hebr" typeface="Arial"/>
+        <a:font script="Thai" typeface="Cordia New"/>
+        <a:font script="Ethi" typeface="Nyala"/>
+        <a:font script="Beng" typeface="Vrinda"/>
+        <a:font script="Gujr" typeface="Shruti"/>
+        <a:font script="Khmr" typeface="DaunPenh"/>
+        <a:font script="Knda" typeface="Tunga"/>
+        <a:font script="Guru" typeface="Raavi"/>
+        <a:font script="Cans" typeface="Euphemia"/>
+        <a:font script="Cher" typeface="Plantagenet Cherokee"/>
+        <a:font script="Yiii" typeface="Microsoft Yi Baiti"/>
+        <a:font script="Tibt" typeface="Microsoft Himalaya"/>
+        <a:font script="Thaa" typeface="MV Boli"/>
+        <a:font script="Deva" typeface="Mangal"/>
+        <a:font script="Telu" typeface="Gautami"/>
+        <a:font script="Taml" typeface="Latha"/>
+        <a:font script="Syrc" typeface="Estrangelo Edessa"/>
+        <a:font script="Orya" typeface="Kalinga"/>
+        <a:font script="Mlym" typeface="Kartika"/>
+        <a:font script="Laoo" typeface="DokChampa"/>
+        <a:font script="Sinh" typeface="Iskoola Pota"/>
+        <a:font script="Mong" typeface="Mongolian Baiti"/>
+        <a:font script="Viet" typeface="Arial"/>
+        <a:font script="Uigh" typeface="Microsoft Uighur"/>
+        <a:font script="Geor" typeface="Sylfaen"/>
+        <a:font script="Armn" typeface="Arial"/>
+        <a:font script="Bugi" typeface="Leelawadee UI"/>
+        <a:font script="Bopo" typeface="Microsoft JhengHei"/>
+        <a:font script="Java" typeface="Javanese Text"/>
+        <a:font script="Lisu" typeface="Segoe UI"/>
+        <a:font script="Mymr" typeface="Myanmar Text"/>
+        <a:font script="Nkoo" typeface="Ebrima"/>
+        <a:font script="Olck" typeface="Nirmala UI"/>
+        <a:font script="Osma" typeface="Ebrima"/>
+        <a:font script="Phag" typeface="Phagspa"/>
+        <a:font script="Syrn" typeface="Estrangelo Edessa"/>
+        <a:font script="Syrj" typeface="Estrangelo Edessa"/>
+        <a:font script="Syre" typeface="Estrangelo Edessa"/>
+        <a:font script="Sora" typeface="Nirmala UI"/>
+        <a:font script="Tale" typeface="Microsoft Tai Le"/>
+        <a:font script="Talu" typeface="Microsoft New Tai Lue"/>
+        <a:font script="Tfng" typeface="Ebrima"/>
+      </a:minorFont>
+    </a:fontScheme>
+    <a:fmtScheme name="Office">
+      <a:fillStyleLst>
+        <a:solidFill>
+          <a:schemeClr val="phClr"/>
+        </a:solidFill>
+        <a:gradFill rotWithShape="1">
+          <a:gsLst>
+            <a:gs pos="0">
+              <a:schemeClr val="phClr">
+                <a:lumMod val="110000"/>
+                <a:satMod val="105000"/>
+                <a:tint val="67000"/>
+              </a:schemeClr>
+            </a:gs>
+            <a:gs pos="50000">
+              <a:schemeClr val="phClr">
+                <a:lumMod val="105000"/>
+                <a:satMod val="103000"/>
+                <a:tint val="73000"/>
+              </a:schemeClr>
+            </a:gs>
+            <a:gs pos="100000">
+              <a:schemeClr val="phClr">
+                <a:lumMod val="105000"/>
+                <a:satMod val="109000"/>
+                <a:tint val="81000"/>
+              </a:schemeClr>
+            </a:gs>
+          </a:gsLst>
+          <a:lin ang="5400000" scaled="0"/>
+        </a:gradFill>
+        <a:gradFill rotWithShape="1">
+          <a:gsLst>
+            <a:gs pos="0">
+              <a:schemeClr val="phClr">
+                <a:satMod val="103000"/>
+                <a:lumMod val="102000"/>
+                <a:tint val="94000"/>
+              </a:schemeClr>
+            </a:gs>
+            <a:gs pos="50000">
+              <a:schemeClr val="phClr">
+                <a:satMod val="110000"/>
+                <a:lumMod val="100000"/>
+                <a:shade val="100000"/>
+              </a:schemeClr>
+            </a:gs>
+            <a:gs pos="100000">
+              <a:schemeClr val="phClr">
+                <a:lumMod val="99000"/>
+                <a:satMod val="120000"/>
+                <a:shade val="78000"/>
+              </a:schemeClr>
+            </a:gs>
+          </a:gsLst>
+          <a:lin ang="5400000" scaled="0"/>
+        </a:gradFill>
+      </a:fillStyleLst>
+      <a:lnStyleLst>
+        <a:ln w="6350" cap="flat" cmpd="sng" algn="ctr">
+          <a:solidFill>
+            <a:schemeClr val="phClr"/>
+          </a:solidFill>
+          <a:prstDash val="solid"/>
+          <a:miter lim="800000"/>
+        </a:ln>
+        <a:ln w="12700" cap="flat" cmpd="sng" algn="ctr">
+          <a:solidFill>
+            <a:schemeClr val="phClr"/>
+          </a:solidFill>
+          <a:prstDash val="solid"/>
+          <a:miter lim="800000"/>
+        </a:ln>
+        <a:ln w="19050" cap="flat" cmpd="sng" algn="ctr">
+          <a:solidFill>
+            <a:schemeClr val="phClr"/>
+          </a:solidFill>
+          <a:prstDash val="solid"/>
+          <a:miter lim="800000"/>
+        </a:ln>
+      </a:lnStyleLst>
+      <a:effectStyleLst>
+        <a:effectStyle>
+          <a:effectLst/>
+        </a:effectStyle>
+        <a:effectStyle>
+          <a:effectLst/>
+        </a:effectStyle>
+        <a:effectStyle>
+          <a:effectLst>
+            <a:outerShdw blurRad="57150" dist="19050" dir="5400000" algn="ctr" rotWithShape="0">
+              <a:srgbClr val="000000">
+                <a:alpha val="63000"/>
+              </a:srgbClr>
+            </a:outerShdw>
+          </a:effectLst>
+        </a:effectStyle>
+      </a:effectStyleLst>
+      <a:bgFillStyleLst>
+        <a:solidFill>
+          <a:schemeClr val="phClr"/>
+        </a:solidFill>
+        <a:solidFill>
+          <a:schemeClr val="phClr">
+            <a:tint val="95000"/>
+            <a:satMod val="170000"/>
+          </a:schemeClr>
+        </a:solidFill>
+        <a:gradFill rotWithShape="1">
+          <a:gsLst>
+            <a:gs pos="0">
+              <a:schemeClr val="phClr">
+                <a:tint val="93000"/>
+                <a:satMod val="150000"/>
+                <a:shade val="98000"/>
+                <a:lumMod val="102000"/>
+              </a:schemeClr>
+            </a:gs>
+            <a:gs pos="50000">
+              <a:schemeClr val="phClr">
+                <a:tint val="98000"/>
+                <a:satMod val="130000"/>
+                <a:shade val="90000"/>
+                <a:lumMod val="103000"/>
+              </a:schemeClr>
+            </a:gs>
+            <a:gs pos="100000">
+              <a:schemeClr val="phClr">
+                <a:shade val="63000"/>
+                <a:satMod val="120000"/>
+              </a:schemeClr>
+            </a:gs>
+          </a:gsLst>
+          <a:lin ang="5400000" scaled="0"/>
+        </a:gradFill>
+      </a:bgFillStyleLst>
+    </a:fmtScheme>
+  </a:themeElements>
+  <a:objectDefaults/>
+  <a:extraClrSchemeLst/>
+  <a:extLst>
+    <a:ext uri="{05A4C25C-085E-4340-85A3-A5531E510DB2}">
+      <thm15:themeFamily xmlns:thm15="http://schemas.microsoft.com/office/thememl/2012/main" name="Office Theme" id="{62F939B6-93AF-4DB8-9C6B-D6C7DFDC589F}" vid="{4A3C46E8-61CC-4603-A589-7422A47A8E4A}"/>
+    </a:ext>
+  </a:extLst>
+</a:theme>
 </file>
</xml_diff>